<commit_message>
Workshop udpate - Terraform code
</commit_message>
<xml_diff>
--- a/images/aws-cloud-wan-diagram.pptx
+++ b/images/aws-cloud-wan-diagram.pptx
@@ -325,7 +325,7 @@
               <a:pPr>
                 <a:defRPr/>
               </a:pPr>
-              <a:t>7/11/22</a:t>
+              <a:t>12/15/22</a:t>
             </a:fld>
             <a:endParaRPr lang="en-US" dirty="0"/>
           </a:p>
@@ -15449,38 +15449,6 @@
       </p:grpSpPr>
       <p:sp>
         <p:nvSpPr>
-          <p:cNvPr id="2" name="Footer Placeholder 1">
-            <a:extLst>
-              <a:ext uri="{FF2B5EF4-FFF2-40B4-BE49-F238E27FC236}">
-                <a16:creationId xmlns:a16="http://schemas.microsoft.com/office/drawing/2014/main" id="{17272581-FFE8-8BDE-FB80-0CCC7B2CC123}"/>
-              </a:ext>
-            </a:extLst>
-          </p:cNvPr>
-          <p:cNvSpPr>
-            <a:spLocks noGrp="1"/>
-          </p:cNvSpPr>
-          <p:nvPr>
-            <p:ph type="ftr" sz="quarter" idx="10"/>
-          </p:nvPr>
-        </p:nvSpPr>
-        <p:spPr/>
-        <p:txBody>
-          <a:bodyPr/>
-          <a:lstStyle/>
-          <a:p>
-            <a:pPr>
-              <a:defRPr/>
-            </a:pPr>
-            <a:r>
-              <a:rPr lang="en-US"/>
-              <a:t>© 2022, Amazon Web Services, Inc. or its affiliates. All rights reserved.</a:t>
-            </a:r>
-            <a:endParaRPr lang="en-US" dirty="0"/>
-          </a:p>
-        </p:txBody>
-      </p:sp>
-      <p:sp>
-        <p:nvSpPr>
           <p:cNvPr id="3" name="Slide Number Placeholder 2">
             <a:extLst>
               <a:ext uri="{FF2B5EF4-FFF2-40B4-BE49-F238E27FC236}">
@@ -15528,8 +15496,8 @@
         </p:nvSpPr>
         <p:spPr>
           <a:xfrm>
-            <a:off x="899960" y="453764"/>
-            <a:ext cx="11050740" cy="5128052"/>
+            <a:off x="413577" y="242887"/>
+            <a:ext cx="11050740" cy="5483489"/>
           </a:xfrm>
           <a:prstGeom prst="rect">
             <a:avLst/>
@@ -15610,7 +15578,7 @@
         </p:blipFill>
         <p:spPr>
           <a:xfrm>
-            <a:off x="899960" y="453763"/>
+            <a:off x="413577" y="242887"/>
             <a:ext cx="381000" cy="381000"/>
           </a:xfrm>
           <a:prstGeom prst="rect">
@@ -15632,8 +15600,8 @@
         </p:nvSpPr>
         <p:spPr>
           <a:xfrm>
-            <a:off x="3612668" y="841132"/>
-            <a:ext cx="3408459" cy="4629365"/>
+            <a:off x="3126285" y="406215"/>
+            <a:ext cx="3408459" cy="5243653"/>
           </a:xfrm>
           <a:prstGeom prst="rect">
             <a:avLst/>
@@ -15716,7 +15684,7 @@
         </p:blipFill>
         <p:spPr>
           <a:xfrm>
-            <a:off x="3612192" y="834640"/>
+            <a:off x="3125809" y="399723"/>
             <a:ext cx="381000" cy="381000"/>
           </a:xfrm>
           <a:prstGeom prst="rect">
@@ -15738,8 +15706,8 @@
         </p:nvSpPr>
         <p:spPr>
           <a:xfrm>
-            <a:off x="7422668" y="841132"/>
-            <a:ext cx="3408459" cy="4629365"/>
+            <a:off x="6936285" y="406215"/>
+            <a:ext cx="3408459" cy="5243652"/>
           </a:xfrm>
           <a:prstGeom prst="rect">
             <a:avLst/>
@@ -15822,7 +15790,7 @@
         </p:blipFill>
         <p:spPr>
           <a:xfrm>
-            <a:off x="7422192" y="834640"/>
+            <a:off x="6935809" y="399723"/>
             <a:ext cx="381000" cy="381000"/>
           </a:xfrm>
           <a:prstGeom prst="rect">
@@ -15846,7 +15814,7 @@
         </p:nvSpPr>
         <p:spPr bwMode="auto">
           <a:xfrm>
-            <a:off x="1219406" y="1607999"/>
+            <a:off x="733023" y="1173082"/>
             <a:ext cx="837206" cy="430887"/>
           </a:xfrm>
           <a:prstGeom prst="rect">
@@ -16016,8 +15984,8 @@
         </p:nvSpPr>
         <p:spPr>
           <a:xfrm>
-            <a:off x="3014731" y="2633140"/>
-            <a:ext cx="8181892" cy="1203807"/>
+            <a:off x="2528348" y="2198223"/>
+            <a:ext cx="8181892" cy="1496886"/>
           </a:xfrm>
           <a:prstGeom prst="roundRect">
             <a:avLst/>
@@ -16081,7 +16049,7 @@
         </p:blipFill>
         <p:spPr bwMode="auto">
           <a:xfrm>
-            <a:off x="2634922" y="2252140"/>
+            <a:off x="2148539" y="1817223"/>
             <a:ext cx="762000" cy="762000"/>
           </a:xfrm>
           <a:prstGeom prst="rect">
@@ -16128,7 +16096,7 @@
         </p:nvSpPr>
         <p:spPr bwMode="auto">
           <a:xfrm>
-            <a:off x="2250571" y="1987098"/>
+            <a:off x="1764188" y="1552181"/>
             <a:ext cx="1415056" cy="276999"/>
           </a:xfrm>
           <a:prstGeom prst="rect">
@@ -16287,7 +16255,7 @@
         </p:nvSpPr>
         <p:spPr>
           <a:xfrm>
-            <a:off x="3569774" y="2680139"/>
+            <a:off x="3083391" y="2245222"/>
             <a:ext cx="7483725" cy="285339"/>
           </a:xfrm>
           <a:prstGeom prst="roundRect">
@@ -16323,7 +16291,7 @@
             <a:pPr algn="ctr"/>
             <a:r>
               <a:rPr lang="en-ES" dirty="0"/>
-              <a:t>Non-Prod</a:t>
+              <a:t>nonprod</a:t>
             </a:r>
           </a:p>
         </p:txBody>
@@ -16342,7 +16310,7 @@
         </p:nvSpPr>
         <p:spPr>
           <a:xfrm>
-            <a:off x="3569774" y="2996131"/>
+            <a:off x="3083391" y="2561214"/>
             <a:ext cx="7483725" cy="285339"/>
           </a:xfrm>
           <a:prstGeom prst="roundRect">
@@ -16378,7 +16346,7 @@
             <a:pPr algn="ctr"/>
             <a:r>
               <a:rPr lang="en-ES" dirty="0"/>
-              <a:t>Prod</a:t>
+              <a:t>prod</a:t>
             </a:r>
           </a:p>
         </p:txBody>
@@ -16397,7 +16365,7 @@
         </p:nvSpPr>
         <p:spPr>
           <a:xfrm>
-            <a:off x="3569774" y="3326914"/>
+            <a:off x="3083391" y="2882269"/>
             <a:ext cx="7483725" cy="285339"/>
           </a:xfrm>
           <a:prstGeom prst="roundRect">
@@ -16436,7 +16404,7 @@
             <a:pPr algn="ctr"/>
             <a:r>
               <a:rPr lang="en-ES" dirty="0"/>
-              <a:t>Shared Services</a:t>
+              <a:t>sharedservices</a:t>
             </a:r>
           </a:p>
         </p:txBody>
@@ -16468,7 +16436,7 @@
         </p:blipFill>
         <p:spPr bwMode="auto">
           <a:xfrm>
-            <a:off x="3550161" y="2643669"/>
+            <a:off x="3063778" y="2208752"/>
             <a:ext cx="358558" cy="358558"/>
           </a:xfrm>
           <a:prstGeom prst="rect">
@@ -16526,7 +16494,7 @@
         </p:blipFill>
         <p:spPr bwMode="auto">
           <a:xfrm>
-            <a:off x="3536996" y="2962484"/>
+            <a:off x="3050613" y="2527567"/>
             <a:ext cx="358558" cy="358558"/>
           </a:xfrm>
           <a:prstGeom prst="rect">
@@ -16584,7 +16552,7 @@
         </p:blipFill>
         <p:spPr bwMode="auto">
           <a:xfrm>
-            <a:off x="3535624" y="3287962"/>
+            <a:off x="3049241" y="2853045"/>
             <a:ext cx="358558" cy="358558"/>
           </a:xfrm>
           <a:prstGeom prst="rect">
@@ -16642,7 +16610,7 @@
         </p:blipFill>
         <p:spPr bwMode="auto">
           <a:xfrm>
-            <a:off x="1405001" y="1118460"/>
+            <a:off x="918618" y="683543"/>
             <a:ext cx="493897" cy="493897"/>
           </a:xfrm>
           <a:prstGeom prst="rect">
@@ -16700,7 +16668,7 @@
         </p:blipFill>
         <p:spPr bwMode="auto">
           <a:xfrm>
-            <a:off x="5082582" y="3628133"/>
+            <a:off x="4610388" y="3501851"/>
             <a:ext cx="457200" cy="457200"/>
           </a:xfrm>
           <a:prstGeom prst="rect">
@@ -16758,7 +16726,7 @@
         </p:blipFill>
         <p:spPr bwMode="auto">
           <a:xfrm>
-            <a:off x="8893026" y="3635966"/>
+            <a:off x="8417273" y="3501851"/>
             <a:ext cx="457200" cy="457200"/>
           </a:xfrm>
           <a:prstGeom prst="rect">
@@ -16803,7 +16771,7 @@
         </p:nvSpPr>
         <p:spPr>
           <a:xfrm>
-            <a:off x="3759014" y="4216881"/>
+            <a:off x="3272631" y="4258622"/>
             <a:ext cx="1474130" cy="1155642"/>
           </a:xfrm>
           <a:prstGeom prst="rect">
@@ -16887,7 +16855,7 @@
         </p:blipFill>
         <p:spPr>
           <a:xfrm>
-            <a:off x="3759014" y="4218469"/>
+            <a:off x="3272631" y="4260210"/>
             <a:ext cx="323490" cy="323490"/>
           </a:xfrm>
           <a:prstGeom prst="rect">
@@ -16911,7 +16879,7 @@
         </p:nvSpPr>
         <p:spPr bwMode="auto">
           <a:xfrm>
-            <a:off x="796441" y="2652307"/>
+            <a:off x="310058" y="2217390"/>
             <a:ext cx="1675493" cy="415498"/>
           </a:xfrm>
           <a:prstGeom prst="rect">
@@ -17093,7 +17061,7 @@
         </p:blipFill>
         <p:spPr bwMode="auto">
           <a:xfrm>
-            <a:off x="1352782" y="2126775"/>
+            <a:off x="866399" y="1691858"/>
             <a:ext cx="569128" cy="569128"/>
           </a:xfrm>
           <a:prstGeom prst="rect">
@@ -17138,7 +17106,7 @@
         </p:nvSpPr>
         <p:spPr>
           <a:xfrm>
-            <a:off x="9212711" y="4224781"/>
+            <a:off x="8726328" y="4266522"/>
             <a:ext cx="1474130" cy="1155642"/>
           </a:xfrm>
           <a:prstGeom prst="rect">
@@ -17222,7 +17190,7 @@
         </p:blipFill>
         <p:spPr>
           <a:xfrm>
-            <a:off x="9212711" y="4226369"/>
+            <a:off x="8726328" y="4268110"/>
             <a:ext cx="323490" cy="323490"/>
           </a:xfrm>
           <a:prstGeom prst="rect">
@@ -17244,7 +17212,7 @@
         </p:nvSpPr>
         <p:spPr>
           <a:xfrm>
-            <a:off x="3743152" y="1334070"/>
+            <a:off x="3256769" y="899153"/>
             <a:ext cx="1474130" cy="1155642"/>
           </a:xfrm>
           <a:prstGeom prst="rect">
@@ -17328,7 +17296,7 @@
         </p:blipFill>
         <p:spPr>
           <a:xfrm>
-            <a:off x="3743152" y="1335658"/>
+            <a:off x="3256769" y="900741"/>
             <a:ext cx="323490" cy="323490"/>
           </a:xfrm>
           <a:prstGeom prst="rect">
@@ -17365,7 +17333,7 @@
         </p:blipFill>
         <p:spPr bwMode="auto">
           <a:xfrm>
-            <a:off x="3931090" y="1710100"/>
+            <a:off x="3444707" y="1275183"/>
             <a:ext cx="415498" cy="415498"/>
           </a:xfrm>
           <a:prstGeom prst="rect">
@@ -17412,7 +17380,7 @@
         </p:nvSpPr>
         <p:spPr bwMode="auto">
           <a:xfrm>
-            <a:off x="3753562" y="2117123"/>
+            <a:off x="3267179" y="1682206"/>
             <a:ext cx="762000" cy="369332"/>
           </a:xfrm>
           <a:prstGeom prst="rect">
@@ -17585,7 +17553,7 @@
         </p:blipFill>
         <p:spPr>
           <a:xfrm>
-            <a:off x="4238763" y="4605833"/>
+            <a:off x="3752380" y="4647574"/>
             <a:ext cx="428524" cy="428524"/>
           </a:xfrm>
           <a:prstGeom prst="rect">
@@ -17621,7 +17589,7 @@
         </p:blipFill>
         <p:spPr>
           <a:xfrm>
-            <a:off x="9735514" y="4608428"/>
+            <a:off x="9249131" y="4650169"/>
             <a:ext cx="428524" cy="428524"/>
           </a:xfrm>
           <a:prstGeom prst="rect">
@@ -17645,7 +17613,7 @@
         </p:nvSpPr>
         <p:spPr bwMode="auto">
           <a:xfrm>
-            <a:off x="3957782" y="5009683"/>
+            <a:off x="3471399" y="5051424"/>
             <a:ext cx="983930" cy="369332"/>
           </a:xfrm>
           <a:prstGeom prst="rect">
@@ -17806,7 +17774,7 @@
         </p:nvSpPr>
         <p:spPr bwMode="auto">
           <a:xfrm>
-            <a:off x="9457811" y="5017583"/>
+            <a:off x="8971428" y="5059324"/>
             <a:ext cx="983930" cy="369332"/>
           </a:xfrm>
           <a:prstGeom prst="rect">
@@ -17980,7 +17948,7 @@
         </p:blipFill>
         <p:spPr bwMode="auto">
           <a:xfrm>
-            <a:off x="4591234" y="1683291"/>
+            <a:off x="4104851" y="1248374"/>
             <a:ext cx="457200" cy="457200"/>
           </a:xfrm>
           <a:prstGeom prst="rect">
@@ -18027,7 +17995,7 @@
         </p:nvSpPr>
         <p:spPr bwMode="auto">
           <a:xfrm>
-            <a:off x="4438834" y="2101540"/>
+            <a:off x="3952451" y="1666623"/>
             <a:ext cx="762000" cy="369332"/>
           </a:xfrm>
           <a:prstGeom prst="rect">
@@ -18186,7 +18154,7 @@
         </p:nvSpPr>
         <p:spPr>
           <a:xfrm>
-            <a:off x="5366033" y="1335834"/>
+            <a:off x="4879650" y="900917"/>
             <a:ext cx="1474130" cy="1155642"/>
           </a:xfrm>
           <a:prstGeom prst="rect">
@@ -18270,7 +18238,7 @@
         </p:blipFill>
         <p:spPr>
           <a:xfrm>
-            <a:off x="5366033" y="1337422"/>
+            <a:off x="4879650" y="902505"/>
             <a:ext cx="323490" cy="323490"/>
           </a:xfrm>
           <a:prstGeom prst="rect">
@@ -18307,7 +18275,7 @@
         </p:blipFill>
         <p:spPr bwMode="auto">
           <a:xfrm>
-            <a:off x="5553971" y="1711864"/>
+            <a:off x="5067588" y="1276947"/>
             <a:ext cx="415498" cy="415498"/>
           </a:xfrm>
           <a:prstGeom prst="rect">
@@ -18354,7 +18322,7 @@
         </p:nvSpPr>
         <p:spPr bwMode="auto">
           <a:xfrm>
-            <a:off x="5376443" y="2118887"/>
+            <a:off x="4890060" y="1683970"/>
             <a:ext cx="762000" cy="369332"/>
           </a:xfrm>
           <a:prstGeom prst="rect">
@@ -18528,7 +18496,7 @@
         </p:blipFill>
         <p:spPr bwMode="auto">
           <a:xfrm>
-            <a:off x="6214115" y="1685055"/>
+            <a:off x="5727732" y="1250138"/>
             <a:ext cx="457200" cy="457200"/>
           </a:xfrm>
           <a:prstGeom prst="rect">
@@ -18575,7 +18543,7 @@
         </p:nvSpPr>
         <p:spPr bwMode="auto">
           <a:xfrm>
-            <a:off x="6061715" y="2103304"/>
+            <a:off x="5575332" y="1668387"/>
             <a:ext cx="762000" cy="369332"/>
           </a:xfrm>
           <a:prstGeom prst="rect">
@@ -18734,7 +18702,7 @@
         </p:nvSpPr>
         <p:spPr>
           <a:xfrm>
-            <a:off x="7579420" y="1340708"/>
+            <a:off x="7093037" y="905791"/>
             <a:ext cx="1474130" cy="1155642"/>
           </a:xfrm>
           <a:prstGeom prst="rect">
@@ -18818,7 +18786,7 @@
         </p:blipFill>
         <p:spPr>
           <a:xfrm>
-            <a:off x="7579420" y="1342296"/>
+            <a:off x="7093037" y="907379"/>
             <a:ext cx="323490" cy="323490"/>
           </a:xfrm>
           <a:prstGeom prst="rect">
@@ -18855,7 +18823,7 @@
         </p:blipFill>
         <p:spPr bwMode="auto">
           <a:xfrm>
-            <a:off x="7767358" y="1716738"/>
+            <a:off x="7280975" y="1281821"/>
             <a:ext cx="415498" cy="415498"/>
           </a:xfrm>
           <a:prstGeom prst="rect">
@@ -18902,7 +18870,7 @@
         </p:nvSpPr>
         <p:spPr bwMode="auto">
           <a:xfrm>
-            <a:off x="7589830" y="2123761"/>
+            <a:off x="7103447" y="1688844"/>
             <a:ext cx="762000" cy="369332"/>
           </a:xfrm>
           <a:prstGeom prst="rect">
@@ -19076,7 +19044,7 @@
         </p:blipFill>
         <p:spPr bwMode="auto">
           <a:xfrm>
-            <a:off x="8427502" y="1689929"/>
+            <a:off x="7941119" y="1255012"/>
             <a:ext cx="457200" cy="457200"/>
           </a:xfrm>
           <a:prstGeom prst="rect">
@@ -19123,7 +19091,7 @@
         </p:nvSpPr>
         <p:spPr bwMode="auto">
           <a:xfrm>
-            <a:off x="8275102" y="2108178"/>
+            <a:off x="7788719" y="1673261"/>
             <a:ext cx="762000" cy="369332"/>
           </a:xfrm>
           <a:prstGeom prst="rect">
@@ -19282,7 +19250,7 @@
         </p:nvSpPr>
         <p:spPr>
           <a:xfrm>
-            <a:off x="9202301" y="1342472"/>
+            <a:off x="8715918" y="907555"/>
             <a:ext cx="1474130" cy="1155642"/>
           </a:xfrm>
           <a:prstGeom prst="rect">
@@ -19366,7 +19334,7 @@
         </p:blipFill>
         <p:spPr>
           <a:xfrm>
-            <a:off x="9202301" y="1344060"/>
+            <a:off x="8715918" y="909143"/>
             <a:ext cx="323490" cy="323490"/>
           </a:xfrm>
           <a:prstGeom prst="rect">
@@ -19403,7 +19371,7 @@
         </p:blipFill>
         <p:spPr bwMode="auto">
           <a:xfrm>
-            <a:off x="9390239" y="1718502"/>
+            <a:off x="8903856" y="1283585"/>
             <a:ext cx="415498" cy="415498"/>
           </a:xfrm>
           <a:prstGeom prst="rect">
@@ -19450,7 +19418,7 @@
         </p:nvSpPr>
         <p:spPr bwMode="auto">
           <a:xfrm>
-            <a:off x="9212711" y="2125525"/>
+            <a:off x="8726328" y="1690608"/>
             <a:ext cx="762000" cy="369332"/>
           </a:xfrm>
           <a:prstGeom prst="rect">
@@ -19624,7 +19592,7 @@
         </p:blipFill>
         <p:spPr bwMode="auto">
           <a:xfrm>
-            <a:off x="10050383" y="1691693"/>
+            <a:off x="9564000" y="1256776"/>
             <a:ext cx="457200" cy="457200"/>
           </a:xfrm>
           <a:prstGeom prst="rect">
@@ -19671,7 +19639,7 @@
         </p:nvSpPr>
         <p:spPr bwMode="auto">
           <a:xfrm>
-            <a:off x="9897983" y="2109942"/>
+            <a:off x="9411600" y="1675025"/>
             <a:ext cx="762000" cy="369332"/>
           </a:xfrm>
           <a:prstGeom prst="rect">
@@ -19833,7 +19801,7 @@
         </p:nvCxnSpPr>
         <p:spPr>
           <a:xfrm>
-            <a:off x="4480217" y="2489712"/>
+            <a:off x="3993834" y="2054795"/>
             <a:ext cx="0" cy="206191"/>
           </a:xfrm>
           <a:prstGeom prst="line">
@@ -19872,7 +19840,7 @@
         </p:nvCxnSpPr>
         <p:spPr>
           <a:xfrm>
-            <a:off x="6103098" y="2491476"/>
+            <a:off x="5616715" y="2056559"/>
             <a:ext cx="0" cy="519446"/>
           </a:xfrm>
           <a:prstGeom prst="line">
@@ -19910,7 +19878,7 @@
         </p:nvCxnSpPr>
         <p:spPr>
           <a:xfrm>
-            <a:off x="8351830" y="2493093"/>
+            <a:off x="7865447" y="2058176"/>
             <a:ext cx="0" cy="202810"/>
           </a:xfrm>
           <a:prstGeom prst="line">
@@ -19949,8 +19917,626 @@
         </p:nvCxnSpPr>
         <p:spPr>
           <a:xfrm>
-            <a:off x="9939366" y="2498114"/>
+            <a:off x="9452983" y="2063197"/>
             <a:ext cx="0" cy="526275"/>
+          </a:xfrm>
+          <a:prstGeom prst="line">
+            <a:avLst/>
+          </a:prstGeom>
+        </p:spPr>
+        <p:style>
+          <a:lnRef idx="3">
+            <a:schemeClr val="dk1"/>
+          </a:lnRef>
+          <a:fillRef idx="0">
+            <a:schemeClr val="dk1"/>
+          </a:fillRef>
+          <a:effectRef idx="2">
+            <a:schemeClr val="dk1"/>
+          </a:effectRef>
+          <a:fontRef idx="minor">
+            <a:schemeClr val="tx1"/>
+          </a:fontRef>
+        </p:style>
+      </p:cxnSp>
+      <p:pic>
+        <p:nvPicPr>
+          <p:cNvPr id="100" name="Graphic 12">
+            <a:extLst>
+              <a:ext uri="{FF2B5EF4-FFF2-40B4-BE49-F238E27FC236}">
+                <a16:creationId xmlns:a16="http://schemas.microsoft.com/office/drawing/2014/main" id="{622ACBB4-DF1D-1FE3-ED3B-5C99491CA287}"/>
+              </a:ext>
+            </a:extLst>
+          </p:cNvPr>
+          <p:cNvPicPr>
+            <a:picLocks noChangeAspect="1" noChangeArrowheads="1"/>
+          </p:cNvPicPr>
+          <p:nvPr/>
+        </p:nvPicPr>
+        <p:blipFill>
+          <a:blip r:embed="rId18">
+            <a:extLst>
+              <a:ext uri="{28A0092B-C50C-407E-A947-70E740481C1C}">
+                <a14:useLocalDpi xmlns:a14="http://schemas.microsoft.com/office/drawing/2010/main" val="0"/>
+              </a:ext>
+            </a:extLst>
+          </a:blip>
+          <a:srcRect/>
+          <a:stretch>
+            <a:fillRect/>
+          </a:stretch>
+        </p:blipFill>
+        <p:spPr bwMode="auto">
+          <a:xfrm>
+            <a:off x="2188118" y="4600694"/>
+            <a:ext cx="469900" cy="469900"/>
+          </a:xfrm>
+          <a:prstGeom prst="rect">
+            <a:avLst/>
+          </a:prstGeom>
+          <a:noFill/>
+          <a:ln>
+            <a:noFill/>
+          </a:ln>
+          <a:extLst>
+            <a:ext uri="{909E8E84-426E-40DD-AFC4-6F175D3DCCD1}">
+              <a14:hiddenFill xmlns:a14="http://schemas.microsoft.com/office/drawing/2010/main">
+                <a:solidFill>
+                  <a:srgbClr val="FFFFFF"/>
+                </a:solidFill>
+              </a14:hiddenFill>
+            </a:ext>
+            <a:ext uri="{91240B29-F687-4F45-9708-019B960494DF}">
+              <a14:hiddenLine xmlns:a14="http://schemas.microsoft.com/office/drawing/2010/main" w="9525">
+                <a:solidFill>
+                  <a:srgbClr val="000000"/>
+                </a:solidFill>
+                <a:miter lim="800000"/>
+                <a:headEnd/>
+                <a:tailEnd/>
+              </a14:hiddenLine>
+            </a:ext>
+          </a:extLst>
+        </p:spPr>
+      </p:pic>
+      <p:pic>
+        <p:nvPicPr>
+          <p:cNvPr id="101" name="Graphic 12">
+            <a:extLst>
+              <a:ext uri="{FF2B5EF4-FFF2-40B4-BE49-F238E27FC236}">
+                <a16:creationId xmlns:a16="http://schemas.microsoft.com/office/drawing/2014/main" id="{5AEE2A90-00B8-A820-7FDE-A20E772FD840}"/>
+              </a:ext>
+            </a:extLst>
+          </p:cNvPr>
+          <p:cNvPicPr>
+            <a:picLocks noChangeAspect="1" noChangeArrowheads="1"/>
+          </p:cNvPicPr>
+          <p:nvPr/>
+        </p:nvPicPr>
+        <p:blipFill>
+          <a:blip r:embed="rId18">
+            <a:extLst>
+              <a:ext uri="{28A0092B-C50C-407E-A947-70E740481C1C}">
+                <a14:useLocalDpi xmlns:a14="http://schemas.microsoft.com/office/drawing/2010/main" val="0"/>
+              </a:ext>
+            </a:extLst>
+          </a:blip>
+          <a:srcRect/>
+          <a:stretch>
+            <a:fillRect/>
+          </a:stretch>
+        </p:blipFill>
+        <p:spPr bwMode="auto">
+          <a:xfrm>
+            <a:off x="10711554" y="4611584"/>
+            <a:ext cx="469900" cy="469900"/>
+          </a:xfrm>
+          <a:prstGeom prst="rect">
+            <a:avLst/>
+          </a:prstGeom>
+          <a:noFill/>
+          <a:ln>
+            <a:noFill/>
+          </a:ln>
+          <a:extLst>
+            <a:ext uri="{909E8E84-426E-40DD-AFC4-6F175D3DCCD1}">
+              <a14:hiddenFill xmlns:a14="http://schemas.microsoft.com/office/drawing/2010/main">
+                <a:solidFill>
+                  <a:srgbClr val="FFFFFF"/>
+                </a:solidFill>
+              </a14:hiddenFill>
+            </a:ext>
+            <a:ext uri="{91240B29-F687-4F45-9708-019B960494DF}">
+              <a14:hiddenLine xmlns:a14="http://schemas.microsoft.com/office/drawing/2010/main" w="9525">
+                <a:solidFill>
+                  <a:srgbClr val="000000"/>
+                </a:solidFill>
+                <a:miter lim="800000"/>
+                <a:headEnd/>
+                <a:tailEnd/>
+              </a14:hiddenLine>
+            </a:ext>
+          </a:extLst>
+        </p:spPr>
+      </p:pic>
+      <p:sp>
+        <p:nvSpPr>
+          <p:cNvPr id="102" name="TextBox 9">
+            <a:extLst>
+              <a:ext uri="{FF2B5EF4-FFF2-40B4-BE49-F238E27FC236}">
+                <a16:creationId xmlns:a16="http://schemas.microsoft.com/office/drawing/2014/main" id="{13A8DDAC-278B-6CD5-8E3B-14A8339604D8}"/>
+              </a:ext>
+            </a:extLst>
+          </p:cNvPr>
+          <p:cNvSpPr txBox="1">
+            <a:spLocks noChangeArrowheads="1"/>
+          </p:cNvSpPr>
+          <p:nvPr/>
+        </p:nvSpPr>
+        <p:spPr bwMode="auto">
+          <a:xfrm>
+            <a:off x="2048115" y="4954145"/>
+            <a:ext cx="749112" cy="276999"/>
+          </a:xfrm>
+          <a:prstGeom prst="rect">
+            <a:avLst/>
+          </a:prstGeom>
+          <a:noFill/>
+          <a:ln>
+            <a:noFill/>
+          </a:ln>
+          <a:extLst>
+            <a:ext uri="{909E8E84-426E-40DD-AFC4-6F175D3DCCD1}">
+              <a14:hiddenFill xmlns:a14="http://schemas.microsoft.com/office/drawing/2010/main">
+                <a:solidFill>
+                  <a:srgbClr val="FFFFFF"/>
+                </a:solidFill>
+              </a14:hiddenFill>
+            </a:ext>
+            <a:ext uri="{91240B29-F687-4F45-9708-019B960494DF}">
+              <a14:hiddenLine xmlns:a14="http://schemas.microsoft.com/office/drawing/2010/main" w="9525">
+                <a:solidFill>
+                  <a:srgbClr val="000000"/>
+                </a:solidFill>
+                <a:miter lim="800000"/>
+                <a:headEnd/>
+                <a:tailEnd/>
+              </a14:hiddenLine>
+            </a:ext>
+          </a:extLst>
+        </p:spPr>
+        <p:txBody>
+          <a:bodyPr wrap="square">
+            <a:spAutoFit/>
+          </a:bodyPr>
+          <a:lstStyle>
+            <a:lvl1pPr>
+              <a:defRPr>
+                <a:solidFill>
+                  <a:schemeClr val="tx1"/>
+                </a:solidFill>
+                <a:latin typeface="Calibri" panose="020F0502020204030204" pitchFamily="34" charset="0"/>
+              </a:defRPr>
+            </a:lvl1pPr>
+            <a:lvl2pPr marL="742950" indent="-285750">
+              <a:defRPr>
+                <a:solidFill>
+                  <a:schemeClr val="tx1"/>
+                </a:solidFill>
+                <a:latin typeface="Calibri" panose="020F0502020204030204" pitchFamily="34" charset="0"/>
+              </a:defRPr>
+            </a:lvl2pPr>
+            <a:lvl3pPr marL="1143000" indent="-228600">
+              <a:defRPr>
+                <a:solidFill>
+                  <a:schemeClr val="tx1"/>
+                </a:solidFill>
+                <a:latin typeface="Calibri" panose="020F0502020204030204" pitchFamily="34" charset="0"/>
+              </a:defRPr>
+            </a:lvl3pPr>
+            <a:lvl4pPr marL="1600200" indent="-228600">
+              <a:defRPr>
+                <a:solidFill>
+                  <a:schemeClr val="tx1"/>
+                </a:solidFill>
+                <a:latin typeface="Calibri" panose="020F0502020204030204" pitchFamily="34" charset="0"/>
+              </a:defRPr>
+            </a:lvl4pPr>
+            <a:lvl5pPr marL="2057400" indent="-228600">
+              <a:defRPr>
+                <a:solidFill>
+                  <a:schemeClr val="tx1"/>
+                </a:solidFill>
+                <a:latin typeface="Calibri" panose="020F0502020204030204" pitchFamily="34" charset="0"/>
+              </a:defRPr>
+            </a:lvl5pPr>
+            <a:lvl6pPr marL="2514600" indent="-228600" eaLnBrk="0" fontAlgn="base" hangingPunct="0">
+              <a:spcBef>
+                <a:spcPct val="0"/>
+              </a:spcBef>
+              <a:spcAft>
+                <a:spcPct val="0"/>
+              </a:spcAft>
+              <a:defRPr>
+                <a:solidFill>
+                  <a:schemeClr val="tx1"/>
+                </a:solidFill>
+                <a:latin typeface="Calibri" panose="020F0502020204030204" pitchFamily="34" charset="0"/>
+              </a:defRPr>
+            </a:lvl6pPr>
+            <a:lvl7pPr marL="2971800" indent="-228600" eaLnBrk="0" fontAlgn="base" hangingPunct="0">
+              <a:spcBef>
+                <a:spcPct val="0"/>
+              </a:spcBef>
+              <a:spcAft>
+                <a:spcPct val="0"/>
+              </a:spcAft>
+              <a:defRPr>
+                <a:solidFill>
+                  <a:schemeClr val="tx1"/>
+                </a:solidFill>
+                <a:latin typeface="Calibri" panose="020F0502020204030204" pitchFamily="34" charset="0"/>
+              </a:defRPr>
+            </a:lvl7pPr>
+            <a:lvl8pPr marL="3429000" indent="-228600" eaLnBrk="0" fontAlgn="base" hangingPunct="0">
+              <a:spcBef>
+                <a:spcPct val="0"/>
+              </a:spcBef>
+              <a:spcAft>
+                <a:spcPct val="0"/>
+              </a:spcAft>
+              <a:defRPr>
+                <a:solidFill>
+                  <a:schemeClr val="tx1"/>
+                </a:solidFill>
+                <a:latin typeface="Calibri" panose="020F0502020204030204" pitchFamily="34" charset="0"/>
+              </a:defRPr>
+            </a:lvl8pPr>
+            <a:lvl9pPr marL="3886200" indent="-228600" eaLnBrk="0" fontAlgn="base" hangingPunct="0">
+              <a:spcBef>
+                <a:spcPct val="0"/>
+              </a:spcBef>
+              <a:spcAft>
+                <a:spcPct val="0"/>
+              </a:spcAft>
+              <a:defRPr>
+                <a:solidFill>
+                  <a:schemeClr val="tx1"/>
+                </a:solidFill>
+                <a:latin typeface="Calibri" panose="020F0502020204030204" pitchFamily="34" charset="0"/>
+              </a:defRPr>
+            </a:lvl9pPr>
+          </a:lstStyle>
+          <a:p>
+            <a:pPr algn="ctr" eaLnBrk="1" hangingPunct="1"/>
+            <a:r>
+              <a:rPr lang="en-US" altLang="en-US" sz="1200" dirty="0">
+                <a:latin typeface="Arial" panose="020B0604020202020204" pitchFamily="34" charset="0"/>
+                <a:ea typeface="Amazon Ember" panose="020B0603020204020204" pitchFamily="34" charset="0"/>
+                <a:cs typeface="Arial" panose="020B0604020202020204" pitchFamily="34" charset="0"/>
+              </a:rPr>
+              <a:t>Internet</a:t>
+            </a:r>
+          </a:p>
+        </p:txBody>
+      </p:sp>
+      <p:sp>
+        <p:nvSpPr>
+          <p:cNvPr id="103" name="TextBox 9">
+            <a:extLst>
+              <a:ext uri="{FF2B5EF4-FFF2-40B4-BE49-F238E27FC236}">
+                <a16:creationId xmlns:a16="http://schemas.microsoft.com/office/drawing/2014/main" id="{DA12F318-D8DC-8C61-00FE-9E9D0934F93C}"/>
+              </a:ext>
+            </a:extLst>
+          </p:cNvPr>
+          <p:cNvSpPr txBox="1">
+            <a:spLocks noChangeArrowheads="1"/>
+          </p:cNvSpPr>
+          <p:nvPr/>
+        </p:nvSpPr>
+        <p:spPr bwMode="auto">
+          <a:xfrm>
+            <a:off x="10576476" y="5000071"/>
+            <a:ext cx="749112" cy="276999"/>
+          </a:xfrm>
+          <a:prstGeom prst="rect">
+            <a:avLst/>
+          </a:prstGeom>
+          <a:noFill/>
+          <a:ln>
+            <a:noFill/>
+          </a:ln>
+          <a:extLst>
+            <a:ext uri="{909E8E84-426E-40DD-AFC4-6F175D3DCCD1}">
+              <a14:hiddenFill xmlns:a14="http://schemas.microsoft.com/office/drawing/2010/main">
+                <a:solidFill>
+                  <a:srgbClr val="FFFFFF"/>
+                </a:solidFill>
+              </a14:hiddenFill>
+            </a:ext>
+            <a:ext uri="{91240B29-F687-4F45-9708-019B960494DF}">
+              <a14:hiddenLine xmlns:a14="http://schemas.microsoft.com/office/drawing/2010/main" w="9525">
+                <a:solidFill>
+                  <a:srgbClr val="000000"/>
+                </a:solidFill>
+                <a:miter lim="800000"/>
+                <a:headEnd/>
+                <a:tailEnd/>
+              </a14:hiddenLine>
+            </a:ext>
+          </a:extLst>
+        </p:spPr>
+        <p:txBody>
+          <a:bodyPr wrap="square">
+            <a:spAutoFit/>
+          </a:bodyPr>
+          <a:lstStyle>
+            <a:lvl1pPr>
+              <a:defRPr>
+                <a:solidFill>
+                  <a:schemeClr val="tx1"/>
+                </a:solidFill>
+                <a:latin typeface="Calibri" panose="020F0502020204030204" pitchFamily="34" charset="0"/>
+              </a:defRPr>
+            </a:lvl1pPr>
+            <a:lvl2pPr marL="742950" indent="-285750">
+              <a:defRPr>
+                <a:solidFill>
+                  <a:schemeClr val="tx1"/>
+                </a:solidFill>
+                <a:latin typeface="Calibri" panose="020F0502020204030204" pitchFamily="34" charset="0"/>
+              </a:defRPr>
+            </a:lvl2pPr>
+            <a:lvl3pPr marL="1143000" indent="-228600">
+              <a:defRPr>
+                <a:solidFill>
+                  <a:schemeClr val="tx1"/>
+                </a:solidFill>
+                <a:latin typeface="Calibri" panose="020F0502020204030204" pitchFamily="34" charset="0"/>
+              </a:defRPr>
+            </a:lvl3pPr>
+            <a:lvl4pPr marL="1600200" indent="-228600">
+              <a:defRPr>
+                <a:solidFill>
+                  <a:schemeClr val="tx1"/>
+                </a:solidFill>
+                <a:latin typeface="Calibri" panose="020F0502020204030204" pitchFamily="34" charset="0"/>
+              </a:defRPr>
+            </a:lvl4pPr>
+            <a:lvl5pPr marL="2057400" indent="-228600">
+              <a:defRPr>
+                <a:solidFill>
+                  <a:schemeClr val="tx1"/>
+                </a:solidFill>
+                <a:latin typeface="Calibri" panose="020F0502020204030204" pitchFamily="34" charset="0"/>
+              </a:defRPr>
+            </a:lvl5pPr>
+            <a:lvl6pPr marL="2514600" indent="-228600" eaLnBrk="0" fontAlgn="base" hangingPunct="0">
+              <a:spcBef>
+                <a:spcPct val="0"/>
+              </a:spcBef>
+              <a:spcAft>
+                <a:spcPct val="0"/>
+              </a:spcAft>
+              <a:defRPr>
+                <a:solidFill>
+                  <a:schemeClr val="tx1"/>
+                </a:solidFill>
+                <a:latin typeface="Calibri" panose="020F0502020204030204" pitchFamily="34" charset="0"/>
+              </a:defRPr>
+            </a:lvl6pPr>
+            <a:lvl7pPr marL="2971800" indent="-228600" eaLnBrk="0" fontAlgn="base" hangingPunct="0">
+              <a:spcBef>
+                <a:spcPct val="0"/>
+              </a:spcBef>
+              <a:spcAft>
+                <a:spcPct val="0"/>
+              </a:spcAft>
+              <a:defRPr>
+                <a:solidFill>
+                  <a:schemeClr val="tx1"/>
+                </a:solidFill>
+                <a:latin typeface="Calibri" panose="020F0502020204030204" pitchFamily="34" charset="0"/>
+              </a:defRPr>
+            </a:lvl7pPr>
+            <a:lvl8pPr marL="3429000" indent="-228600" eaLnBrk="0" fontAlgn="base" hangingPunct="0">
+              <a:spcBef>
+                <a:spcPct val="0"/>
+              </a:spcBef>
+              <a:spcAft>
+                <a:spcPct val="0"/>
+              </a:spcAft>
+              <a:defRPr>
+                <a:solidFill>
+                  <a:schemeClr val="tx1"/>
+                </a:solidFill>
+                <a:latin typeface="Calibri" panose="020F0502020204030204" pitchFamily="34" charset="0"/>
+              </a:defRPr>
+            </a:lvl8pPr>
+            <a:lvl9pPr marL="3886200" indent="-228600" eaLnBrk="0" fontAlgn="base" hangingPunct="0">
+              <a:spcBef>
+                <a:spcPct val="0"/>
+              </a:spcBef>
+              <a:spcAft>
+                <a:spcPct val="0"/>
+              </a:spcAft>
+              <a:defRPr>
+                <a:solidFill>
+                  <a:schemeClr val="tx1"/>
+                </a:solidFill>
+                <a:latin typeface="Calibri" panose="020F0502020204030204" pitchFamily="34" charset="0"/>
+              </a:defRPr>
+            </a:lvl9pPr>
+          </a:lstStyle>
+          <a:p>
+            <a:pPr algn="ctr" eaLnBrk="1" hangingPunct="1"/>
+            <a:r>
+              <a:rPr lang="en-US" altLang="en-US" sz="1200" dirty="0">
+                <a:latin typeface="Arial" panose="020B0604020202020204" pitchFamily="34" charset="0"/>
+                <a:ea typeface="Amazon Ember" panose="020B0603020204020204" pitchFamily="34" charset="0"/>
+                <a:cs typeface="Arial" panose="020B0604020202020204" pitchFamily="34" charset="0"/>
+              </a:rPr>
+              <a:t>Internet</a:t>
+            </a:r>
+          </a:p>
+        </p:txBody>
+      </p:sp>
+      <p:cxnSp>
+        <p:nvCxnSpPr>
+          <p:cNvPr id="104" name="Straight Connector 103">
+            <a:extLst>
+              <a:ext uri="{FF2B5EF4-FFF2-40B4-BE49-F238E27FC236}">
+                <a16:creationId xmlns:a16="http://schemas.microsoft.com/office/drawing/2014/main" id="{1626ECF9-8101-9DA3-F934-D7A13C8F1AB7}"/>
+              </a:ext>
+            </a:extLst>
+          </p:cNvPr>
+          <p:cNvCxnSpPr>
+            <a:cxnSpLocks/>
+            <a:stCxn id="27" idx="1"/>
+            <a:endCxn id="100" idx="3"/>
+          </p:cNvCxnSpPr>
+          <p:nvPr/>
+        </p:nvCxnSpPr>
+        <p:spPr>
+          <a:xfrm flipH="1" flipV="1">
+            <a:off x="2658018" y="4835644"/>
+            <a:ext cx="614613" cy="799"/>
+          </a:xfrm>
+          <a:prstGeom prst="line">
+            <a:avLst/>
+          </a:prstGeom>
+        </p:spPr>
+        <p:style>
+          <a:lnRef idx="3">
+            <a:schemeClr val="dk1"/>
+          </a:lnRef>
+          <a:fillRef idx="0">
+            <a:schemeClr val="dk1"/>
+          </a:fillRef>
+          <a:effectRef idx="2">
+            <a:schemeClr val="dk1"/>
+          </a:effectRef>
+          <a:fontRef idx="minor">
+            <a:schemeClr val="tx1"/>
+          </a:fontRef>
+        </p:style>
+      </p:cxnSp>
+      <p:cxnSp>
+        <p:nvCxnSpPr>
+          <p:cNvPr id="107" name="Straight Connector 106">
+            <a:extLst>
+              <a:ext uri="{FF2B5EF4-FFF2-40B4-BE49-F238E27FC236}">
+                <a16:creationId xmlns:a16="http://schemas.microsoft.com/office/drawing/2014/main" id="{BF0D33EC-29DE-9400-C54E-E87F47B54259}"/>
+              </a:ext>
+            </a:extLst>
+          </p:cNvPr>
+          <p:cNvCxnSpPr>
+            <a:cxnSpLocks/>
+            <a:stCxn id="101" idx="1"/>
+            <a:endCxn id="33" idx="3"/>
+          </p:cNvCxnSpPr>
+          <p:nvPr/>
+        </p:nvCxnSpPr>
+        <p:spPr>
+          <a:xfrm flipH="1" flipV="1">
+            <a:off x="10200458" y="4844343"/>
+            <a:ext cx="511096" cy="2191"/>
+          </a:xfrm>
+          <a:prstGeom prst="line">
+            <a:avLst/>
+          </a:prstGeom>
+        </p:spPr>
+        <p:style>
+          <a:lnRef idx="3">
+            <a:schemeClr val="dk1"/>
+          </a:lnRef>
+          <a:fillRef idx="0">
+            <a:schemeClr val="dk1"/>
+          </a:fillRef>
+          <a:effectRef idx="2">
+            <a:schemeClr val="dk1"/>
+          </a:effectRef>
+          <a:fontRef idx="minor">
+            <a:schemeClr val="tx1"/>
+          </a:fontRef>
+        </p:style>
+      </p:cxnSp>
+      <p:sp>
+        <p:nvSpPr>
+          <p:cNvPr id="25" name="Rounded Rectangle 24">
+            <a:extLst>
+              <a:ext uri="{FF2B5EF4-FFF2-40B4-BE49-F238E27FC236}">
+                <a16:creationId xmlns:a16="http://schemas.microsoft.com/office/drawing/2014/main" id="{D5BE0959-4D02-E724-3282-7C0D000A328F}"/>
+              </a:ext>
+            </a:extLst>
+          </p:cNvPr>
+          <p:cNvSpPr/>
+          <p:nvPr/>
+        </p:nvSpPr>
+        <p:spPr>
+          <a:xfrm>
+            <a:off x="3063778" y="3209390"/>
+            <a:ext cx="7483725" cy="285339"/>
+          </a:xfrm>
+          <a:prstGeom prst="roundRect">
+            <a:avLst/>
+          </a:prstGeom>
+          <a:solidFill>
+            <a:schemeClr val="accent3">
+              <a:lumMod val="75000"/>
+            </a:schemeClr>
+          </a:solidFill>
+          <a:ln>
+            <a:noFill/>
+          </a:ln>
+        </p:spPr>
+        <p:style>
+          <a:lnRef idx="2">
+            <a:schemeClr val="accent1">
+              <a:shade val="50000"/>
+            </a:schemeClr>
+          </a:lnRef>
+          <a:fillRef idx="1">
+            <a:schemeClr val="accent1"/>
+          </a:fillRef>
+          <a:effectRef idx="0">
+            <a:schemeClr val="accent1"/>
+          </a:effectRef>
+          <a:fontRef idx="minor">
+            <a:schemeClr val="lt1"/>
+          </a:fontRef>
+        </p:style>
+        <p:txBody>
+          <a:bodyPr rtlCol="0" anchor="ctr"/>
+          <a:lstStyle/>
+          <a:p>
+            <a:pPr algn="ctr"/>
+            <a:r>
+              <a:rPr lang="en-ES" dirty="0"/>
+              <a:t>legacy</a:t>
+            </a:r>
+          </a:p>
+        </p:txBody>
+      </p:sp>
+      <p:cxnSp>
+        <p:nvCxnSpPr>
+          <p:cNvPr id="97" name="Straight Connector 96">
+            <a:extLst>
+              <a:ext uri="{FF2B5EF4-FFF2-40B4-BE49-F238E27FC236}">
+                <a16:creationId xmlns:a16="http://schemas.microsoft.com/office/drawing/2014/main" id="{941809C9-52A6-8AA3-7314-8379FCC08892}"/>
+              </a:ext>
+            </a:extLst>
+          </p:cNvPr>
+          <p:cNvCxnSpPr>
+            <a:cxnSpLocks/>
+            <a:endCxn id="27" idx="0"/>
+          </p:cNvCxnSpPr>
+          <p:nvPr/>
+        </p:nvCxnSpPr>
+        <p:spPr>
+          <a:xfrm>
+            <a:off x="4009696" y="3177336"/>
+            <a:ext cx="0" cy="1081286"/>
           </a:xfrm>
           <a:prstGeom prst="line">
             <a:avLst/>
@@ -19988,8 +20574,1322 @@
         </p:nvCxnSpPr>
         <p:spPr>
           <a:xfrm>
-            <a:off x="9949776" y="3620153"/>
-            <a:ext cx="0" cy="604628"/>
+            <a:off x="9452983" y="3177336"/>
+            <a:ext cx="10410" cy="1089186"/>
+          </a:xfrm>
+          <a:prstGeom prst="line">
+            <a:avLst/>
+          </a:prstGeom>
+        </p:spPr>
+        <p:style>
+          <a:lnRef idx="3">
+            <a:schemeClr val="dk1"/>
+          </a:lnRef>
+          <a:fillRef idx="0">
+            <a:schemeClr val="dk1"/>
+          </a:fillRef>
+          <a:effectRef idx="2">
+            <a:schemeClr val="dk1"/>
+          </a:effectRef>
+          <a:fontRef idx="minor">
+            <a:schemeClr val="tx1"/>
+          </a:fontRef>
+        </p:style>
+      </p:cxnSp>
+      <p:pic>
+        <p:nvPicPr>
+          <p:cNvPr id="26" name="Graphic 6">
+            <a:extLst>
+              <a:ext uri="{FF2B5EF4-FFF2-40B4-BE49-F238E27FC236}">
+                <a16:creationId xmlns:a16="http://schemas.microsoft.com/office/drawing/2014/main" id="{8026D5C2-7181-4127-8666-63DBB69928C5}"/>
+              </a:ext>
+            </a:extLst>
+          </p:cNvPr>
+          <p:cNvPicPr>
+            <a:picLocks noChangeAspect="1" noChangeArrowheads="1"/>
+          </p:cNvPicPr>
+          <p:nvPr/>
+        </p:nvPicPr>
+        <p:blipFill>
+          <a:blip r:embed="rId8">
+            <a:extLst>
+              <a:ext uri="{96DAC541-7B7A-43D3-8B79-37D633B846F1}">
+                <asvg:svgBlip xmlns:asvg="http://schemas.microsoft.com/office/drawing/2016/SVG/main" r:embed="rId9"/>
+              </a:ext>
+            </a:extLst>
+          </a:blip>
+          <a:srcRect/>
+          <a:stretch/>
+        </p:blipFill>
+        <p:spPr bwMode="auto">
+          <a:xfrm>
+            <a:off x="3047869" y="3171860"/>
+            <a:ext cx="358558" cy="358558"/>
+          </a:xfrm>
+          <a:prstGeom prst="rect">
+            <a:avLst/>
+          </a:prstGeom>
+          <a:noFill/>
+          <a:ln>
+            <a:noFill/>
+          </a:ln>
+          <a:extLst>
+            <a:ext uri="{909E8E84-426E-40DD-AFC4-6F175D3DCCD1}">
+              <a14:hiddenFill xmlns:a14="http://schemas.microsoft.com/office/drawing/2010/main">
+                <a:solidFill>
+                  <a:srgbClr val="FFFFFF"/>
+                </a:solidFill>
+              </a14:hiddenFill>
+            </a:ext>
+            <a:ext uri="{91240B29-F687-4F45-9708-019B960494DF}">
+              <a14:hiddenLine xmlns:a14="http://schemas.microsoft.com/office/drawing/2010/main" w="9525">
+                <a:solidFill>
+                  <a:srgbClr val="000000"/>
+                </a:solidFill>
+                <a:miter lim="800000"/>
+                <a:headEnd/>
+                <a:tailEnd/>
+              </a14:hiddenLine>
+            </a:ext>
+          </a:extLst>
+        </p:spPr>
+      </p:pic>
+      <p:sp>
+        <p:nvSpPr>
+          <p:cNvPr id="29" name="Rectangle 28">
+            <a:extLst>
+              <a:ext uri="{FF2B5EF4-FFF2-40B4-BE49-F238E27FC236}">
+                <a16:creationId xmlns:a16="http://schemas.microsoft.com/office/drawing/2014/main" id="{29175722-56D5-9C7E-0CFF-F091A536B425}"/>
+              </a:ext>
+            </a:extLst>
+          </p:cNvPr>
+          <p:cNvSpPr/>
+          <p:nvPr/>
+        </p:nvSpPr>
+        <p:spPr>
+          <a:xfrm>
+            <a:off x="5063667" y="4583700"/>
+            <a:ext cx="1296918" cy="1004056"/>
+          </a:xfrm>
+          <a:prstGeom prst="rect">
+            <a:avLst/>
+          </a:prstGeom>
+          <a:noFill/>
+          <a:ln w="12700">
+            <a:solidFill>
+              <a:srgbClr val="1E8900"/>
+            </a:solidFill>
+          </a:ln>
+        </p:spPr>
+        <p:style>
+          <a:lnRef idx="2">
+            <a:schemeClr val="accent1">
+              <a:shade val="50000"/>
+            </a:schemeClr>
+          </a:lnRef>
+          <a:fillRef idx="1">
+            <a:schemeClr val="accent1"/>
+          </a:fillRef>
+          <a:effectRef idx="0">
+            <a:schemeClr val="accent1"/>
+          </a:effectRef>
+          <a:fontRef idx="minor">
+            <a:schemeClr val="lt1"/>
+          </a:fontRef>
+        </p:style>
+        <p:txBody>
+          <a:bodyPr lIns="502920" tIns="91440"/>
+          <a:lstStyle/>
+          <a:p>
+            <a:pPr eaLnBrk="1" fontAlgn="auto" hangingPunct="1">
+              <a:spcBef>
+                <a:spcPts val="0"/>
+              </a:spcBef>
+              <a:spcAft>
+                <a:spcPts val="0"/>
+              </a:spcAft>
+              <a:defRPr/>
+            </a:pPr>
+            <a:r>
+              <a:rPr lang="en-US" sz="1000" dirty="0">
+                <a:ln w="0"/>
+                <a:solidFill>
+                  <a:srgbClr val="1E8900"/>
+                </a:solidFill>
+                <a:latin typeface="Arial" panose="020B0604020202020204" pitchFamily="34" charset="0"/>
+                <a:cs typeface="Arial" panose="020B0604020202020204" pitchFamily="34" charset="0"/>
+              </a:rPr>
+              <a:t>Legacy VPC</a:t>
+            </a:r>
+          </a:p>
+        </p:txBody>
+      </p:sp>
+      <p:pic>
+        <p:nvPicPr>
+          <p:cNvPr id="30" name="Graphic 29">
+            <a:extLst>
+              <a:ext uri="{FF2B5EF4-FFF2-40B4-BE49-F238E27FC236}">
+                <a16:creationId xmlns:a16="http://schemas.microsoft.com/office/drawing/2014/main" id="{ACA6AEFE-A1D8-FBEB-DFE1-756FEE5B1E95}"/>
+              </a:ext>
+            </a:extLst>
+          </p:cNvPr>
+          <p:cNvPicPr>
+            <a:picLocks noChangeAspect="1"/>
+          </p:cNvPicPr>
+          <p:nvPr/>
+        </p:nvPicPr>
+        <p:blipFill>
+          <a:blip r:embed="rId12">
+            <a:extLst>
+              <a:ext uri="{96DAC541-7B7A-43D3-8B79-37D633B846F1}">
+                <asvg:svgBlip xmlns:asvg="http://schemas.microsoft.com/office/drawing/2016/SVG/main" r:embed="rId13"/>
+              </a:ext>
+            </a:extLst>
+          </a:blip>
+          <a:stretch>
+            <a:fillRect/>
+          </a:stretch>
+        </p:blipFill>
+        <p:spPr>
+          <a:xfrm>
+            <a:off x="5063667" y="4585288"/>
+            <a:ext cx="323490" cy="323490"/>
+          </a:xfrm>
+          <a:prstGeom prst="rect">
+            <a:avLst/>
+          </a:prstGeom>
+        </p:spPr>
+      </p:pic>
+      <p:pic>
+        <p:nvPicPr>
+          <p:cNvPr id="35" name="Graphic 5">
+            <a:extLst>
+              <a:ext uri="{FF2B5EF4-FFF2-40B4-BE49-F238E27FC236}">
+                <a16:creationId xmlns:a16="http://schemas.microsoft.com/office/drawing/2014/main" id="{C75BAE04-5A37-2728-E773-62AD0350C5F8}"/>
+              </a:ext>
+            </a:extLst>
+          </p:cNvPr>
+          <p:cNvPicPr>
+            <a:picLocks noChangeAspect="1" noChangeArrowheads="1"/>
+          </p:cNvPicPr>
+          <p:nvPr/>
+        </p:nvPicPr>
+        <p:blipFill>
+          <a:blip r:embed="rId14">
+            <a:extLst>
+              <a:ext uri="{28A0092B-C50C-407E-A947-70E740481C1C}">
+                <a14:useLocalDpi xmlns:a14="http://schemas.microsoft.com/office/drawing/2010/main" val="0"/>
+              </a:ext>
+            </a:extLst>
+          </a:blip>
+          <a:srcRect/>
+          <a:stretch>
+            <a:fillRect/>
+          </a:stretch>
+        </p:blipFill>
+        <p:spPr bwMode="auto">
+          <a:xfrm>
+            <a:off x="5299103" y="4979580"/>
+            <a:ext cx="293334" cy="293334"/>
+          </a:xfrm>
+          <a:prstGeom prst="rect">
+            <a:avLst/>
+          </a:prstGeom>
+          <a:noFill/>
+          <a:ln>
+            <a:noFill/>
+          </a:ln>
+          <a:extLst>
+            <a:ext uri="{909E8E84-426E-40DD-AFC4-6F175D3DCCD1}">
+              <a14:hiddenFill xmlns:a14="http://schemas.microsoft.com/office/drawing/2010/main">
+                <a:solidFill>
+                  <a:srgbClr val="FFFFFF"/>
+                </a:solidFill>
+              </a14:hiddenFill>
+            </a:ext>
+            <a:ext uri="{91240B29-F687-4F45-9708-019B960494DF}">
+              <a14:hiddenLine xmlns:a14="http://schemas.microsoft.com/office/drawing/2010/main" w="9525">
+                <a:solidFill>
+                  <a:srgbClr val="000000"/>
+                </a:solidFill>
+                <a:miter lim="800000"/>
+                <a:headEnd/>
+                <a:tailEnd/>
+              </a14:hiddenLine>
+            </a:ext>
+          </a:extLst>
+        </p:spPr>
+      </p:pic>
+      <p:sp>
+        <p:nvSpPr>
+          <p:cNvPr id="36" name="TextBox 15">
+            <a:extLst>
+              <a:ext uri="{FF2B5EF4-FFF2-40B4-BE49-F238E27FC236}">
+                <a16:creationId xmlns:a16="http://schemas.microsoft.com/office/drawing/2014/main" id="{A9145BF0-D1F6-25AA-985C-1A9220A32A0A}"/>
+              </a:ext>
+            </a:extLst>
+          </p:cNvPr>
+          <p:cNvSpPr txBox="1">
+            <a:spLocks noChangeArrowheads="1"/>
+          </p:cNvSpPr>
+          <p:nvPr/>
+        </p:nvSpPr>
+        <p:spPr bwMode="auto">
+          <a:xfrm>
+            <a:off x="5063682" y="5287062"/>
+            <a:ext cx="762000" cy="200055"/>
+          </a:xfrm>
+          <a:prstGeom prst="rect">
+            <a:avLst/>
+          </a:prstGeom>
+          <a:noFill/>
+          <a:ln>
+            <a:noFill/>
+          </a:ln>
+          <a:extLst>
+            <a:ext uri="{909E8E84-426E-40DD-AFC4-6F175D3DCCD1}">
+              <a14:hiddenFill xmlns:a14="http://schemas.microsoft.com/office/drawing/2010/main">
+                <a:solidFill>
+                  <a:srgbClr val="FFFFFF"/>
+                </a:solidFill>
+              </a14:hiddenFill>
+            </a:ext>
+            <a:ext uri="{91240B29-F687-4F45-9708-019B960494DF}">
+              <a14:hiddenLine xmlns:a14="http://schemas.microsoft.com/office/drawing/2010/main" w="9525">
+                <a:solidFill>
+                  <a:srgbClr val="000000"/>
+                </a:solidFill>
+                <a:miter lim="800000"/>
+                <a:headEnd/>
+                <a:tailEnd/>
+              </a14:hiddenLine>
+            </a:ext>
+          </a:extLst>
+        </p:spPr>
+        <p:txBody>
+          <a:bodyPr wrap="square">
+            <a:spAutoFit/>
+          </a:bodyPr>
+          <a:lstStyle>
+            <a:lvl1pPr>
+              <a:defRPr>
+                <a:solidFill>
+                  <a:schemeClr val="tx1"/>
+                </a:solidFill>
+                <a:latin typeface="Calibri" panose="020F0502020204030204" pitchFamily="34" charset="0"/>
+              </a:defRPr>
+            </a:lvl1pPr>
+            <a:lvl2pPr marL="742950" indent="-285750">
+              <a:defRPr>
+                <a:solidFill>
+                  <a:schemeClr val="tx1"/>
+                </a:solidFill>
+                <a:latin typeface="Calibri" panose="020F0502020204030204" pitchFamily="34" charset="0"/>
+              </a:defRPr>
+            </a:lvl2pPr>
+            <a:lvl3pPr marL="1143000" indent="-228600">
+              <a:defRPr>
+                <a:solidFill>
+                  <a:schemeClr val="tx1"/>
+                </a:solidFill>
+                <a:latin typeface="Calibri" panose="020F0502020204030204" pitchFamily="34" charset="0"/>
+              </a:defRPr>
+            </a:lvl3pPr>
+            <a:lvl4pPr marL="1600200" indent="-228600">
+              <a:defRPr>
+                <a:solidFill>
+                  <a:schemeClr val="tx1"/>
+                </a:solidFill>
+                <a:latin typeface="Calibri" panose="020F0502020204030204" pitchFamily="34" charset="0"/>
+              </a:defRPr>
+            </a:lvl4pPr>
+            <a:lvl5pPr marL="2057400" indent="-228600">
+              <a:defRPr>
+                <a:solidFill>
+                  <a:schemeClr val="tx1"/>
+                </a:solidFill>
+                <a:latin typeface="Calibri" panose="020F0502020204030204" pitchFamily="34" charset="0"/>
+              </a:defRPr>
+            </a:lvl5pPr>
+            <a:lvl6pPr marL="2514600" indent="-228600" eaLnBrk="0" fontAlgn="base" hangingPunct="0">
+              <a:spcBef>
+                <a:spcPct val="0"/>
+              </a:spcBef>
+              <a:spcAft>
+                <a:spcPct val="0"/>
+              </a:spcAft>
+              <a:defRPr>
+                <a:solidFill>
+                  <a:schemeClr val="tx1"/>
+                </a:solidFill>
+                <a:latin typeface="Calibri" panose="020F0502020204030204" pitchFamily="34" charset="0"/>
+              </a:defRPr>
+            </a:lvl6pPr>
+            <a:lvl7pPr marL="2971800" indent="-228600" eaLnBrk="0" fontAlgn="base" hangingPunct="0">
+              <a:spcBef>
+                <a:spcPct val="0"/>
+              </a:spcBef>
+              <a:spcAft>
+                <a:spcPct val="0"/>
+              </a:spcAft>
+              <a:defRPr>
+                <a:solidFill>
+                  <a:schemeClr val="tx1"/>
+                </a:solidFill>
+                <a:latin typeface="Calibri" panose="020F0502020204030204" pitchFamily="34" charset="0"/>
+              </a:defRPr>
+            </a:lvl7pPr>
+            <a:lvl8pPr marL="3429000" indent="-228600" eaLnBrk="0" fontAlgn="base" hangingPunct="0">
+              <a:spcBef>
+                <a:spcPct val="0"/>
+              </a:spcBef>
+              <a:spcAft>
+                <a:spcPct val="0"/>
+              </a:spcAft>
+              <a:defRPr>
+                <a:solidFill>
+                  <a:schemeClr val="tx1"/>
+                </a:solidFill>
+                <a:latin typeface="Calibri" panose="020F0502020204030204" pitchFamily="34" charset="0"/>
+              </a:defRPr>
+            </a:lvl8pPr>
+            <a:lvl9pPr marL="3886200" indent="-228600" eaLnBrk="0" fontAlgn="base" hangingPunct="0">
+              <a:spcBef>
+                <a:spcPct val="0"/>
+              </a:spcBef>
+              <a:spcAft>
+                <a:spcPct val="0"/>
+              </a:spcAft>
+              <a:defRPr>
+                <a:solidFill>
+                  <a:schemeClr val="tx1"/>
+                </a:solidFill>
+                <a:latin typeface="Calibri" panose="020F0502020204030204" pitchFamily="34" charset="0"/>
+              </a:defRPr>
+            </a:lvl9pPr>
+          </a:lstStyle>
+          <a:p>
+            <a:pPr algn="ctr" eaLnBrk="1" hangingPunct="1"/>
+            <a:r>
+              <a:rPr lang="en-US" altLang="en-US" sz="700" dirty="0">
+                <a:latin typeface="Arial" panose="020B0604020202020204" pitchFamily="34" charset="0"/>
+                <a:ea typeface="Amazon Ember" panose="020B0603020204020204" pitchFamily="34" charset="0"/>
+                <a:cs typeface="Arial" panose="020B0604020202020204" pitchFamily="34" charset="0"/>
+              </a:rPr>
+              <a:t>EC2 instances</a:t>
+            </a:r>
+          </a:p>
+        </p:txBody>
+      </p:sp>
+      <p:pic>
+        <p:nvPicPr>
+          <p:cNvPr id="37" name="Graphic 29">
+            <a:extLst>
+              <a:ext uri="{FF2B5EF4-FFF2-40B4-BE49-F238E27FC236}">
+                <a16:creationId xmlns:a16="http://schemas.microsoft.com/office/drawing/2014/main" id="{691AFFC7-5165-F30B-A50B-C9AE0F198148}"/>
+              </a:ext>
+            </a:extLst>
+          </p:cNvPr>
+          <p:cNvPicPr>
+            <a:picLocks noChangeAspect="1" noChangeArrowheads="1"/>
+          </p:cNvPicPr>
+          <p:nvPr/>
+        </p:nvPicPr>
+        <p:blipFill>
+          <a:blip r:embed="rId17">
+            <a:extLst>
+              <a:ext uri="{28A0092B-C50C-407E-A947-70E740481C1C}">
+                <a14:useLocalDpi xmlns:a14="http://schemas.microsoft.com/office/drawing/2010/main" val="0"/>
+              </a:ext>
+            </a:extLst>
+          </a:blip>
+          <a:srcRect/>
+          <a:stretch>
+            <a:fillRect/>
+          </a:stretch>
+        </p:blipFill>
+        <p:spPr bwMode="auto">
+          <a:xfrm>
+            <a:off x="5795196" y="4927777"/>
+            <a:ext cx="369632" cy="369632"/>
+          </a:xfrm>
+          <a:prstGeom prst="rect">
+            <a:avLst/>
+          </a:prstGeom>
+          <a:noFill/>
+          <a:ln>
+            <a:noFill/>
+          </a:ln>
+          <a:extLst>
+            <a:ext uri="{909E8E84-426E-40DD-AFC4-6F175D3DCCD1}">
+              <a14:hiddenFill xmlns:a14="http://schemas.microsoft.com/office/drawing/2010/main">
+                <a:solidFill>
+                  <a:srgbClr val="FFFFFF"/>
+                </a:solidFill>
+              </a14:hiddenFill>
+            </a:ext>
+            <a:ext uri="{91240B29-F687-4F45-9708-019B960494DF}">
+              <a14:hiddenLine xmlns:a14="http://schemas.microsoft.com/office/drawing/2010/main" w="9525">
+                <a:solidFill>
+                  <a:srgbClr val="000000"/>
+                </a:solidFill>
+                <a:miter lim="800000"/>
+                <a:headEnd/>
+                <a:tailEnd/>
+              </a14:hiddenLine>
+            </a:ext>
+          </a:extLst>
+        </p:spPr>
+      </p:pic>
+      <p:sp>
+        <p:nvSpPr>
+          <p:cNvPr id="38" name="TextBox 15">
+            <a:extLst>
+              <a:ext uri="{FF2B5EF4-FFF2-40B4-BE49-F238E27FC236}">
+                <a16:creationId xmlns:a16="http://schemas.microsoft.com/office/drawing/2014/main" id="{0842E271-A5C3-CBED-CF2F-1AE9C83685A4}"/>
+              </a:ext>
+            </a:extLst>
+          </p:cNvPr>
+          <p:cNvSpPr txBox="1">
+            <a:spLocks noChangeArrowheads="1"/>
+          </p:cNvSpPr>
+          <p:nvPr/>
+        </p:nvSpPr>
+        <p:spPr bwMode="auto">
+          <a:xfrm>
+            <a:off x="5599012" y="5279979"/>
+            <a:ext cx="762000" cy="307777"/>
+          </a:xfrm>
+          <a:prstGeom prst="rect">
+            <a:avLst/>
+          </a:prstGeom>
+          <a:noFill/>
+          <a:ln>
+            <a:noFill/>
+          </a:ln>
+          <a:extLst>
+            <a:ext uri="{909E8E84-426E-40DD-AFC4-6F175D3DCCD1}">
+              <a14:hiddenFill xmlns:a14="http://schemas.microsoft.com/office/drawing/2010/main">
+                <a:solidFill>
+                  <a:srgbClr val="FFFFFF"/>
+                </a:solidFill>
+              </a14:hiddenFill>
+            </a:ext>
+            <a:ext uri="{91240B29-F687-4F45-9708-019B960494DF}">
+              <a14:hiddenLine xmlns:a14="http://schemas.microsoft.com/office/drawing/2010/main" w="9525">
+                <a:solidFill>
+                  <a:srgbClr val="000000"/>
+                </a:solidFill>
+                <a:miter lim="800000"/>
+                <a:headEnd/>
+                <a:tailEnd/>
+              </a14:hiddenLine>
+            </a:ext>
+          </a:extLst>
+        </p:spPr>
+        <p:txBody>
+          <a:bodyPr wrap="square">
+            <a:spAutoFit/>
+          </a:bodyPr>
+          <a:lstStyle>
+            <a:lvl1pPr>
+              <a:defRPr>
+                <a:solidFill>
+                  <a:schemeClr val="tx1"/>
+                </a:solidFill>
+                <a:latin typeface="Calibri" panose="020F0502020204030204" pitchFamily="34" charset="0"/>
+              </a:defRPr>
+            </a:lvl1pPr>
+            <a:lvl2pPr marL="742950" indent="-285750">
+              <a:defRPr>
+                <a:solidFill>
+                  <a:schemeClr val="tx1"/>
+                </a:solidFill>
+                <a:latin typeface="Calibri" panose="020F0502020204030204" pitchFamily="34" charset="0"/>
+              </a:defRPr>
+            </a:lvl2pPr>
+            <a:lvl3pPr marL="1143000" indent="-228600">
+              <a:defRPr>
+                <a:solidFill>
+                  <a:schemeClr val="tx1"/>
+                </a:solidFill>
+                <a:latin typeface="Calibri" panose="020F0502020204030204" pitchFamily="34" charset="0"/>
+              </a:defRPr>
+            </a:lvl3pPr>
+            <a:lvl4pPr marL="1600200" indent="-228600">
+              <a:defRPr>
+                <a:solidFill>
+                  <a:schemeClr val="tx1"/>
+                </a:solidFill>
+                <a:latin typeface="Calibri" panose="020F0502020204030204" pitchFamily="34" charset="0"/>
+              </a:defRPr>
+            </a:lvl4pPr>
+            <a:lvl5pPr marL="2057400" indent="-228600">
+              <a:defRPr>
+                <a:solidFill>
+                  <a:schemeClr val="tx1"/>
+                </a:solidFill>
+                <a:latin typeface="Calibri" panose="020F0502020204030204" pitchFamily="34" charset="0"/>
+              </a:defRPr>
+            </a:lvl5pPr>
+            <a:lvl6pPr marL="2514600" indent="-228600" eaLnBrk="0" fontAlgn="base" hangingPunct="0">
+              <a:spcBef>
+                <a:spcPct val="0"/>
+              </a:spcBef>
+              <a:spcAft>
+                <a:spcPct val="0"/>
+              </a:spcAft>
+              <a:defRPr>
+                <a:solidFill>
+                  <a:schemeClr val="tx1"/>
+                </a:solidFill>
+                <a:latin typeface="Calibri" panose="020F0502020204030204" pitchFamily="34" charset="0"/>
+              </a:defRPr>
+            </a:lvl6pPr>
+            <a:lvl7pPr marL="2971800" indent="-228600" eaLnBrk="0" fontAlgn="base" hangingPunct="0">
+              <a:spcBef>
+                <a:spcPct val="0"/>
+              </a:spcBef>
+              <a:spcAft>
+                <a:spcPct val="0"/>
+              </a:spcAft>
+              <a:defRPr>
+                <a:solidFill>
+                  <a:schemeClr val="tx1"/>
+                </a:solidFill>
+                <a:latin typeface="Calibri" panose="020F0502020204030204" pitchFamily="34" charset="0"/>
+              </a:defRPr>
+            </a:lvl7pPr>
+            <a:lvl8pPr marL="3429000" indent="-228600" eaLnBrk="0" fontAlgn="base" hangingPunct="0">
+              <a:spcBef>
+                <a:spcPct val="0"/>
+              </a:spcBef>
+              <a:spcAft>
+                <a:spcPct val="0"/>
+              </a:spcAft>
+              <a:defRPr>
+                <a:solidFill>
+                  <a:schemeClr val="tx1"/>
+                </a:solidFill>
+                <a:latin typeface="Calibri" panose="020F0502020204030204" pitchFamily="34" charset="0"/>
+              </a:defRPr>
+            </a:lvl8pPr>
+            <a:lvl9pPr marL="3886200" indent="-228600" eaLnBrk="0" fontAlgn="base" hangingPunct="0">
+              <a:spcBef>
+                <a:spcPct val="0"/>
+              </a:spcBef>
+              <a:spcAft>
+                <a:spcPct val="0"/>
+              </a:spcAft>
+              <a:defRPr>
+                <a:solidFill>
+                  <a:schemeClr val="tx1"/>
+                </a:solidFill>
+                <a:latin typeface="Calibri" panose="020F0502020204030204" pitchFamily="34" charset="0"/>
+              </a:defRPr>
+            </a:lvl9pPr>
+          </a:lstStyle>
+          <a:p>
+            <a:pPr algn="ctr" eaLnBrk="1" hangingPunct="1"/>
+            <a:r>
+              <a:rPr lang="en-US" altLang="en-US" sz="700" dirty="0">
+                <a:latin typeface="Arial" panose="020B0604020202020204" pitchFamily="34" charset="0"/>
+                <a:ea typeface="Amazon Ember" panose="020B0603020204020204" pitchFamily="34" charset="0"/>
+                <a:cs typeface="Arial" panose="020B0604020202020204" pitchFamily="34" charset="0"/>
+              </a:rPr>
+              <a:t>VPC endpoints</a:t>
+            </a:r>
+          </a:p>
+        </p:txBody>
+      </p:sp>
+      <p:sp>
+        <p:nvSpPr>
+          <p:cNvPr id="41" name="Rectangle 40">
+            <a:extLst>
+              <a:ext uri="{FF2B5EF4-FFF2-40B4-BE49-F238E27FC236}">
+                <a16:creationId xmlns:a16="http://schemas.microsoft.com/office/drawing/2014/main" id="{B726F803-AF44-17F5-52DC-18D2DDAE8E97}"/>
+              </a:ext>
+            </a:extLst>
+          </p:cNvPr>
+          <p:cNvSpPr/>
+          <p:nvPr/>
+        </p:nvSpPr>
+        <p:spPr>
+          <a:xfrm>
+            <a:off x="7103447" y="4599553"/>
+            <a:ext cx="1296918" cy="1004056"/>
+          </a:xfrm>
+          <a:prstGeom prst="rect">
+            <a:avLst/>
+          </a:prstGeom>
+          <a:noFill/>
+          <a:ln w="12700">
+            <a:solidFill>
+              <a:srgbClr val="1E8900"/>
+            </a:solidFill>
+          </a:ln>
+        </p:spPr>
+        <p:style>
+          <a:lnRef idx="2">
+            <a:schemeClr val="accent1">
+              <a:shade val="50000"/>
+            </a:schemeClr>
+          </a:lnRef>
+          <a:fillRef idx="1">
+            <a:schemeClr val="accent1"/>
+          </a:fillRef>
+          <a:effectRef idx="0">
+            <a:schemeClr val="accent1"/>
+          </a:effectRef>
+          <a:fontRef idx="minor">
+            <a:schemeClr val="lt1"/>
+          </a:fontRef>
+        </p:style>
+        <p:txBody>
+          <a:bodyPr lIns="502920" tIns="91440"/>
+          <a:lstStyle/>
+          <a:p>
+            <a:pPr eaLnBrk="1" fontAlgn="auto" hangingPunct="1">
+              <a:spcBef>
+                <a:spcPts val="0"/>
+              </a:spcBef>
+              <a:spcAft>
+                <a:spcPts val="0"/>
+              </a:spcAft>
+              <a:defRPr/>
+            </a:pPr>
+            <a:r>
+              <a:rPr lang="en-US" sz="1000" dirty="0">
+                <a:ln w="0"/>
+                <a:solidFill>
+                  <a:srgbClr val="1E8900"/>
+                </a:solidFill>
+                <a:latin typeface="Arial" panose="020B0604020202020204" pitchFamily="34" charset="0"/>
+                <a:cs typeface="Arial" panose="020B0604020202020204" pitchFamily="34" charset="0"/>
+              </a:rPr>
+              <a:t>Legacy VPC</a:t>
+            </a:r>
+          </a:p>
+        </p:txBody>
+      </p:sp>
+      <p:pic>
+        <p:nvPicPr>
+          <p:cNvPr id="42" name="Graphic 41">
+            <a:extLst>
+              <a:ext uri="{FF2B5EF4-FFF2-40B4-BE49-F238E27FC236}">
+                <a16:creationId xmlns:a16="http://schemas.microsoft.com/office/drawing/2014/main" id="{0202C402-0548-B6FA-72A0-A57F60BAA5E5}"/>
+              </a:ext>
+            </a:extLst>
+          </p:cNvPr>
+          <p:cNvPicPr>
+            <a:picLocks noChangeAspect="1"/>
+          </p:cNvPicPr>
+          <p:nvPr/>
+        </p:nvPicPr>
+        <p:blipFill>
+          <a:blip r:embed="rId12">
+            <a:extLst>
+              <a:ext uri="{96DAC541-7B7A-43D3-8B79-37D633B846F1}">
+                <asvg:svgBlip xmlns:asvg="http://schemas.microsoft.com/office/drawing/2016/SVG/main" r:embed="rId13"/>
+              </a:ext>
+            </a:extLst>
+          </a:blip>
+          <a:stretch>
+            <a:fillRect/>
+          </a:stretch>
+        </p:blipFill>
+        <p:spPr>
+          <a:xfrm>
+            <a:off x="7103447" y="4601141"/>
+            <a:ext cx="323490" cy="323490"/>
+          </a:xfrm>
+          <a:prstGeom prst="rect">
+            <a:avLst/>
+          </a:prstGeom>
+        </p:spPr>
+      </p:pic>
+      <p:pic>
+        <p:nvPicPr>
+          <p:cNvPr id="44" name="Graphic 5">
+            <a:extLst>
+              <a:ext uri="{FF2B5EF4-FFF2-40B4-BE49-F238E27FC236}">
+                <a16:creationId xmlns:a16="http://schemas.microsoft.com/office/drawing/2014/main" id="{6B6FDD1B-247E-7877-260D-3B2DA3DECA2F}"/>
+              </a:ext>
+            </a:extLst>
+          </p:cNvPr>
+          <p:cNvPicPr>
+            <a:picLocks noChangeAspect="1" noChangeArrowheads="1"/>
+          </p:cNvPicPr>
+          <p:nvPr/>
+        </p:nvPicPr>
+        <p:blipFill>
+          <a:blip r:embed="rId14">
+            <a:extLst>
+              <a:ext uri="{28A0092B-C50C-407E-A947-70E740481C1C}">
+                <a14:useLocalDpi xmlns:a14="http://schemas.microsoft.com/office/drawing/2010/main" val="0"/>
+              </a:ext>
+            </a:extLst>
+          </a:blip>
+          <a:srcRect/>
+          <a:stretch>
+            <a:fillRect/>
+          </a:stretch>
+        </p:blipFill>
+        <p:spPr bwMode="auto">
+          <a:xfrm>
+            <a:off x="7358237" y="4994669"/>
+            <a:ext cx="293334" cy="293334"/>
+          </a:xfrm>
+          <a:prstGeom prst="rect">
+            <a:avLst/>
+          </a:prstGeom>
+          <a:noFill/>
+          <a:ln>
+            <a:noFill/>
+          </a:ln>
+          <a:extLst>
+            <a:ext uri="{909E8E84-426E-40DD-AFC4-6F175D3DCCD1}">
+              <a14:hiddenFill xmlns:a14="http://schemas.microsoft.com/office/drawing/2010/main">
+                <a:solidFill>
+                  <a:srgbClr val="FFFFFF"/>
+                </a:solidFill>
+              </a14:hiddenFill>
+            </a:ext>
+            <a:ext uri="{91240B29-F687-4F45-9708-019B960494DF}">
+              <a14:hiddenLine xmlns:a14="http://schemas.microsoft.com/office/drawing/2010/main" w="9525">
+                <a:solidFill>
+                  <a:srgbClr val="000000"/>
+                </a:solidFill>
+                <a:miter lim="800000"/>
+                <a:headEnd/>
+                <a:tailEnd/>
+              </a14:hiddenLine>
+            </a:ext>
+          </a:extLst>
+        </p:spPr>
+      </p:pic>
+      <p:sp>
+        <p:nvSpPr>
+          <p:cNvPr id="46" name="TextBox 15">
+            <a:extLst>
+              <a:ext uri="{FF2B5EF4-FFF2-40B4-BE49-F238E27FC236}">
+                <a16:creationId xmlns:a16="http://schemas.microsoft.com/office/drawing/2014/main" id="{E3A201AB-B9F8-15BD-9267-1BA93C68EBBE}"/>
+              </a:ext>
+            </a:extLst>
+          </p:cNvPr>
+          <p:cNvSpPr txBox="1">
+            <a:spLocks noChangeArrowheads="1"/>
+          </p:cNvSpPr>
+          <p:nvPr/>
+        </p:nvSpPr>
+        <p:spPr bwMode="auto">
+          <a:xfrm>
+            <a:off x="7125720" y="5282111"/>
+            <a:ext cx="762000" cy="200055"/>
+          </a:xfrm>
+          <a:prstGeom prst="rect">
+            <a:avLst/>
+          </a:prstGeom>
+          <a:noFill/>
+          <a:ln>
+            <a:noFill/>
+          </a:ln>
+          <a:extLst>
+            <a:ext uri="{909E8E84-426E-40DD-AFC4-6F175D3DCCD1}">
+              <a14:hiddenFill xmlns:a14="http://schemas.microsoft.com/office/drawing/2010/main">
+                <a:solidFill>
+                  <a:srgbClr val="FFFFFF"/>
+                </a:solidFill>
+              </a14:hiddenFill>
+            </a:ext>
+            <a:ext uri="{91240B29-F687-4F45-9708-019B960494DF}">
+              <a14:hiddenLine xmlns:a14="http://schemas.microsoft.com/office/drawing/2010/main" w="9525">
+                <a:solidFill>
+                  <a:srgbClr val="000000"/>
+                </a:solidFill>
+                <a:miter lim="800000"/>
+                <a:headEnd/>
+                <a:tailEnd/>
+              </a14:hiddenLine>
+            </a:ext>
+          </a:extLst>
+        </p:spPr>
+        <p:txBody>
+          <a:bodyPr wrap="square">
+            <a:spAutoFit/>
+          </a:bodyPr>
+          <a:lstStyle>
+            <a:lvl1pPr>
+              <a:defRPr>
+                <a:solidFill>
+                  <a:schemeClr val="tx1"/>
+                </a:solidFill>
+                <a:latin typeface="Calibri" panose="020F0502020204030204" pitchFamily="34" charset="0"/>
+              </a:defRPr>
+            </a:lvl1pPr>
+            <a:lvl2pPr marL="742950" indent="-285750">
+              <a:defRPr>
+                <a:solidFill>
+                  <a:schemeClr val="tx1"/>
+                </a:solidFill>
+                <a:latin typeface="Calibri" panose="020F0502020204030204" pitchFamily="34" charset="0"/>
+              </a:defRPr>
+            </a:lvl2pPr>
+            <a:lvl3pPr marL="1143000" indent="-228600">
+              <a:defRPr>
+                <a:solidFill>
+                  <a:schemeClr val="tx1"/>
+                </a:solidFill>
+                <a:latin typeface="Calibri" panose="020F0502020204030204" pitchFamily="34" charset="0"/>
+              </a:defRPr>
+            </a:lvl3pPr>
+            <a:lvl4pPr marL="1600200" indent="-228600">
+              <a:defRPr>
+                <a:solidFill>
+                  <a:schemeClr val="tx1"/>
+                </a:solidFill>
+                <a:latin typeface="Calibri" panose="020F0502020204030204" pitchFamily="34" charset="0"/>
+              </a:defRPr>
+            </a:lvl4pPr>
+            <a:lvl5pPr marL="2057400" indent="-228600">
+              <a:defRPr>
+                <a:solidFill>
+                  <a:schemeClr val="tx1"/>
+                </a:solidFill>
+                <a:latin typeface="Calibri" panose="020F0502020204030204" pitchFamily="34" charset="0"/>
+              </a:defRPr>
+            </a:lvl5pPr>
+            <a:lvl6pPr marL="2514600" indent="-228600" eaLnBrk="0" fontAlgn="base" hangingPunct="0">
+              <a:spcBef>
+                <a:spcPct val="0"/>
+              </a:spcBef>
+              <a:spcAft>
+                <a:spcPct val="0"/>
+              </a:spcAft>
+              <a:defRPr>
+                <a:solidFill>
+                  <a:schemeClr val="tx1"/>
+                </a:solidFill>
+                <a:latin typeface="Calibri" panose="020F0502020204030204" pitchFamily="34" charset="0"/>
+              </a:defRPr>
+            </a:lvl6pPr>
+            <a:lvl7pPr marL="2971800" indent="-228600" eaLnBrk="0" fontAlgn="base" hangingPunct="0">
+              <a:spcBef>
+                <a:spcPct val="0"/>
+              </a:spcBef>
+              <a:spcAft>
+                <a:spcPct val="0"/>
+              </a:spcAft>
+              <a:defRPr>
+                <a:solidFill>
+                  <a:schemeClr val="tx1"/>
+                </a:solidFill>
+                <a:latin typeface="Calibri" panose="020F0502020204030204" pitchFamily="34" charset="0"/>
+              </a:defRPr>
+            </a:lvl7pPr>
+            <a:lvl8pPr marL="3429000" indent="-228600" eaLnBrk="0" fontAlgn="base" hangingPunct="0">
+              <a:spcBef>
+                <a:spcPct val="0"/>
+              </a:spcBef>
+              <a:spcAft>
+                <a:spcPct val="0"/>
+              </a:spcAft>
+              <a:defRPr>
+                <a:solidFill>
+                  <a:schemeClr val="tx1"/>
+                </a:solidFill>
+                <a:latin typeface="Calibri" panose="020F0502020204030204" pitchFamily="34" charset="0"/>
+              </a:defRPr>
+            </a:lvl8pPr>
+            <a:lvl9pPr marL="3886200" indent="-228600" eaLnBrk="0" fontAlgn="base" hangingPunct="0">
+              <a:spcBef>
+                <a:spcPct val="0"/>
+              </a:spcBef>
+              <a:spcAft>
+                <a:spcPct val="0"/>
+              </a:spcAft>
+              <a:defRPr>
+                <a:solidFill>
+                  <a:schemeClr val="tx1"/>
+                </a:solidFill>
+                <a:latin typeface="Calibri" panose="020F0502020204030204" pitchFamily="34" charset="0"/>
+              </a:defRPr>
+            </a:lvl9pPr>
+          </a:lstStyle>
+          <a:p>
+            <a:pPr algn="ctr" eaLnBrk="1" hangingPunct="1"/>
+            <a:r>
+              <a:rPr lang="en-US" altLang="en-US" sz="700" dirty="0">
+                <a:latin typeface="Arial" panose="020B0604020202020204" pitchFamily="34" charset="0"/>
+                <a:ea typeface="Amazon Ember" panose="020B0603020204020204" pitchFamily="34" charset="0"/>
+                <a:cs typeface="Arial" panose="020B0604020202020204" pitchFamily="34" charset="0"/>
+              </a:rPr>
+              <a:t>EC2 instances</a:t>
+            </a:r>
+          </a:p>
+        </p:txBody>
+      </p:sp>
+      <p:pic>
+        <p:nvPicPr>
+          <p:cNvPr id="51" name="Graphic 29">
+            <a:extLst>
+              <a:ext uri="{FF2B5EF4-FFF2-40B4-BE49-F238E27FC236}">
+                <a16:creationId xmlns:a16="http://schemas.microsoft.com/office/drawing/2014/main" id="{BA285AE3-3398-670F-5736-8E5996C8944B}"/>
+              </a:ext>
+            </a:extLst>
+          </p:cNvPr>
+          <p:cNvPicPr>
+            <a:picLocks noChangeAspect="1" noChangeArrowheads="1"/>
+          </p:cNvPicPr>
+          <p:nvPr/>
+        </p:nvPicPr>
+        <p:blipFill>
+          <a:blip r:embed="rId17">
+            <a:extLst>
+              <a:ext uri="{28A0092B-C50C-407E-A947-70E740481C1C}">
+                <a14:useLocalDpi xmlns:a14="http://schemas.microsoft.com/office/drawing/2010/main" val="0"/>
+              </a:ext>
+            </a:extLst>
+          </a:blip>
+          <a:srcRect/>
+          <a:stretch>
+            <a:fillRect/>
+          </a:stretch>
+        </p:blipFill>
+        <p:spPr bwMode="auto">
+          <a:xfrm>
+            <a:off x="7834976" y="4943630"/>
+            <a:ext cx="369632" cy="369632"/>
+          </a:xfrm>
+          <a:prstGeom prst="rect">
+            <a:avLst/>
+          </a:prstGeom>
+          <a:noFill/>
+          <a:ln>
+            <a:noFill/>
+          </a:ln>
+          <a:extLst>
+            <a:ext uri="{909E8E84-426E-40DD-AFC4-6F175D3DCCD1}">
+              <a14:hiddenFill xmlns:a14="http://schemas.microsoft.com/office/drawing/2010/main">
+                <a:solidFill>
+                  <a:srgbClr val="FFFFFF"/>
+                </a:solidFill>
+              </a14:hiddenFill>
+            </a:ext>
+            <a:ext uri="{91240B29-F687-4F45-9708-019B960494DF}">
+              <a14:hiddenLine xmlns:a14="http://schemas.microsoft.com/office/drawing/2010/main" w="9525">
+                <a:solidFill>
+                  <a:srgbClr val="000000"/>
+                </a:solidFill>
+                <a:miter lim="800000"/>
+                <a:headEnd/>
+                <a:tailEnd/>
+              </a14:hiddenLine>
+            </a:ext>
+          </a:extLst>
+        </p:spPr>
+      </p:pic>
+      <p:sp>
+        <p:nvSpPr>
+          <p:cNvPr id="52" name="TextBox 15">
+            <a:extLst>
+              <a:ext uri="{FF2B5EF4-FFF2-40B4-BE49-F238E27FC236}">
+                <a16:creationId xmlns:a16="http://schemas.microsoft.com/office/drawing/2014/main" id="{A82D403A-AEAA-F641-5DB3-69020F3FCC90}"/>
+              </a:ext>
+            </a:extLst>
+          </p:cNvPr>
+          <p:cNvSpPr txBox="1">
+            <a:spLocks noChangeArrowheads="1"/>
+          </p:cNvSpPr>
+          <p:nvPr/>
+        </p:nvSpPr>
+        <p:spPr bwMode="auto">
+          <a:xfrm>
+            <a:off x="7638792" y="5295832"/>
+            <a:ext cx="762000" cy="307777"/>
+          </a:xfrm>
+          <a:prstGeom prst="rect">
+            <a:avLst/>
+          </a:prstGeom>
+          <a:noFill/>
+          <a:ln>
+            <a:noFill/>
+          </a:ln>
+          <a:extLst>
+            <a:ext uri="{909E8E84-426E-40DD-AFC4-6F175D3DCCD1}">
+              <a14:hiddenFill xmlns:a14="http://schemas.microsoft.com/office/drawing/2010/main">
+                <a:solidFill>
+                  <a:srgbClr val="FFFFFF"/>
+                </a:solidFill>
+              </a14:hiddenFill>
+            </a:ext>
+            <a:ext uri="{91240B29-F687-4F45-9708-019B960494DF}">
+              <a14:hiddenLine xmlns:a14="http://schemas.microsoft.com/office/drawing/2010/main" w="9525">
+                <a:solidFill>
+                  <a:srgbClr val="000000"/>
+                </a:solidFill>
+                <a:miter lim="800000"/>
+                <a:headEnd/>
+                <a:tailEnd/>
+              </a14:hiddenLine>
+            </a:ext>
+          </a:extLst>
+        </p:spPr>
+        <p:txBody>
+          <a:bodyPr wrap="square">
+            <a:spAutoFit/>
+          </a:bodyPr>
+          <a:lstStyle>
+            <a:lvl1pPr>
+              <a:defRPr>
+                <a:solidFill>
+                  <a:schemeClr val="tx1"/>
+                </a:solidFill>
+                <a:latin typeface="Calibri" panose="020F0502020204030204" pitchFamily="34" charset="0"/>
+              </a:defRPr>
+            </a:lvl1pPr>
+            <a:lvl2pPr marL="742950" indent="-285750">
+              <a:defRPr>
+                <a:solidFill>
+                  <a:schemeClr val="tx1"/>
+                </a:solidFill>
+                <a:latin typeface="Calibri" panose="020F0502020204030204" pitchFamily="34" charset="0"/>
+              </a:defRPr>
+            </a:lvl2pPr>
+            <a:lvl3pPr marL="1143000" indent="-228600">
+              <a:defRPr>
+                <a:solidFill>
+                  <a:schemeClr val="tx1"/>
+                </a:solidFill>
+                <a:latin typeface="Calibri" panose="020F0502020204030204" pitchFamily="34" charset="0"/>
+              </a:defRPr>
+            </a:lvl3pPr>
+            <a:lvl4pPr marL="1600200" indent="-228600">
+              <a:defRPr>
+                <a:solidFill>
+                  <a:schemeClr val="tx1"/>
+                </a:solidFill>
+                <a:latin typeface="Calibri" panose="020F0502020204030204" pitchFamily="34" charset="0"/>
+              </a:defRPr>
+            </a:lvl4pPr>
+            <a:lvl5pPr marL="2057400" indent="-228600">
+              <a:defRPr>
+                <a:solidFill>
+                  <a:schemeClr val="tx1"/>
+                </a:solidFill>
+                <a:latin typeface="Calibri" panose="020F0502020204030204" pitchFamily="34" charset="0"/>
+              </a:defRPr>
+            </a:lvl5pPr>
+            <a:lvl6pPr marL="2514600" indent="-228600" eaLnBrk="0" fontAlgn="base" hangingPunct="0">
+              <a:spcBef>
+                <a:spcPct val="0"/>
+              </a:spcBef>
+              <a:spcAft>
+                <a:spcPct val="0"/>
+              </a:spcAft>
+              <a:defRPr>
+                <a:solidFill>
+                  <a:schemeClr val="tx1"/>
+                </a:solidFill>
+                <a:latin typeface="Calibri" panose="020F0502020204030204" pitchFamily="34" charset="0"/>
+              </a:defRPr>
+            </a:lvl6pPr>
+            <a:lvl7pPr marL="2971800" indent="-228600" eaLnBrk="0" fontAlgn="base" hangingPunct="0">
+              <a:spcBef>
+                <a:spcPct val="0"/>
+              </a:spcBef>
+              <a:spcAft>
+                <a:spcPct val="0"/>
+              </a:spcAft>
+              <a:defRPr>
+                <a:solidFill>
+                  <a:schemeClr val="tx1"/>
+                </a:solidFill>
+                <a:latin typeface="Calibri" panose="020F0502020204030204" pitchFamily="34" charset="0"/>
+              </a:defRPr>
+            </a:lvl7pPr>
+            <a:lvl8pPr marL="3429000" indent="-228600" eaLnBrk="0" fontAlgn="base" hangingPunct="0">
+              <a:spcBef>
+                <a:spcPct val="0"/>
+              </a:spcBef>
+              <a:spcAft>
+                <a:spcPct val="0"/>
+              </a:spcAft>
+              <a:defRPr>
+                <a:solidFill>
+                  <a:schemeClr val="tx1"/>
+                </a:solidFill>
+                <a:latin typeface="Calibri" panose="020F0502020204030204" pitchFamily="34" charset="0"/>
+              </a:defRPr>
+            </a:lvl8pPr>
+            <a:lvl9pPr marL="3886200" indent="-228600" eaLnBrk="0" fontAlgn="base" hangingPunct="0">
+              <a:spcBef>
+                <a:spcPct val="0"/>
+              </a:spcBef>
+              <a:spcAft>
+                <a:spcPct val="0"/>
+              </a:spcAft>
+              <a:defRPr>
+                <a:solidFill>
+                  <a:schemeClr val="tx1"/>
+                </a:solidFill>
+                <a:latin typeface="Calibri" panose="020F0502020204030204" pitchFamily="34" charset="0"/>
+              </a:defRPr>
+            </a:lvl9pPr>
+          </a:lstStyle>
+          <a:p>
+            <a:pPr algn="ctr" eaLnBrk="1" hangingPunct="1"/>
+            <a:r>
+              <a:rPr lang="en-US" altLang="en-US" sz="700" dirty="0">
+                <a:latin typeface="Arial" panose="020B0604020202020204" pitchFamily="34" charset="0"/>
+                <a:ea typeface="Amazon Ember" panose="020B0603020204020204" pitchFamily="34" charset="0"/>
+                <a:cs typeface="Arial" panose="020B0604020202020204" pitchFamily="34" charset="0"/>
+              </a:rPr>
+              <a:t>VPC endpoints</a:t>
+            </a:r>
+          </a:p>
+        </p:txBody>
+      </p:sp>
+      <p:pic>
+        <p:nvPicPr>
+          <p:cNvPr id="53" name="Graphic 7">
+            <a:extLst>
+              <a:ext uri="{FF2B5EF4-FFF2-40B4-BE49-F238E27FC236}">
+                <a16:creationId xmlns:a16="http://schemas.microsoft.com/office/drawing/2014/main" id="{14DFB263-EC28-E942-6180-FD44F35813B6}"/>
+              </a:ext>
+            </a:extLst>
+          </p:cNvPr>
+          <p:cNvPicPr>
+            <a:picLocks noChangeAspect="1" noChangeArrowheads="1"/>
+          </p:cNvPicPr>
+          <p:nvPr/>
+        </p:nvPicPr>
+        <p:blipFill>
+          <a:blip r:embed="rId19">
+            <a:extLst>
+              <a:ext uri="{28A0092B-C50C-407E-A947-70E740481C1C}">
+                <a14:useLocalDpi xmlns:a14="http://schemas.microsoft.com/office/drawing/2010/main" val="0"/>
+              </a:ext>
+            </a:extLst>
+          </a:blip>
+          <a:srcRect/>
+          <a:stretch>
+            <a:fillRect/>
+          </a:stretch>
+        </p:blipFill>
+        <p:spPr bwMode="auto">
+          <a:xfrm>
+            <a:off x="5468060" y="3851907"/>
+            <a:ext cx="485154" cy="485154"/>
+          </a:xfrm>
+          <a:prstGeom prst="rect">
+            <a:avLst/>
+          </a:prstGeom>
+          <a:noFill/>
+          <a:ln>
+            <a:noFill/>
+          </a:ln>
+          <a:extLst>
+            <a:ext uri="{909E8E84-426E-40DD-AFC4-6F175D3DCCD1}">
+              <a14:hiddenFill xmlns:a14="http://schemas.microsoft.com/office/drawing/2010/main">
+                <a:solidFill>
+                  <a:srgbClr val="FFFFFF"/>
+                </a:solidFill>
+              </a14:hiddenFill>
+            </a:ext>
+            <a:ext uri="{91240B29-F687-4F45-9708-019B960494DF}">
+              <a14:hiddenLine xmlns:a14="http://schemas.microsoft.com/office/drawing/2010/main" w="9525">
+                <a:solidFill>
+                  <a:srgbClr val="000000"/>
+                </a:solidFill>
+                <a:miter lim="800000"/>
+                <a:headEnd/>
+                <a:tailEnd/>
+              </a14:hiddenLine>
+            </a:ext>
+          </a:extLst>
+        </p:spPr>
+      </p:pic>
+      <p:pic>
+        <p:nvPicPr>
+          <p:cNvPr id="54" name="Graphic 7">
+            <a:extLst>
+              <a:ext uri="{FF2B5EF4-FFF2-40B4-BE49-F238E27FC236}">
+                <a16:creationId xmlns:a16="http://schemas.microsoft.com/office/drawing/2014/main" id="{3EA3C675-69BA-E689-4C03-0D462AD156F5}"/>
+              </a:ext>
+            </a:extLst>
+          </p:cNvPr>
+          <p:cNvPicPr>
+            <a:picLocks noChangeAspect="1" noChangeArrowheads="1"/>
+          </p:cNvPicPr>
+          <p:nvPr/>
+        </p:nvPicPr>
+        <p:blipFill>
+          <a:blip r:embed="rId19">
+            <a:extLst>
+              <a:ext uri="{28A0092B-C50C-407E-A947-70E740481C1C}">
+                <a14:useLocalDpi xmlns:a14="http://schemas.microsoft.com/office/drawing/2010/main" val="0"/>
+              </a:ext>
+            </a:extLst>
+          </a:blip>
+          <a:srcRect/>
+          <a:stretch>
+            <a:fillRect/>
+          </a:stretch>
+        </p:blipFill>
+        <p:spPr bwMode="auto">
+          <a:xfrm>
+            <a:off x="7509329" y="3846931"/>
+            <a:ext cx="485154" cy="485154"/>
+          </a:xfrm>
+          <a:prstGeom prst="rect">
+            <a:avLst/>
+          </a:prstGeom>
+          <a:noFill/>
+          <a:ln>
+            <a:noFill/>
+          </a:ln>
+          <a:extLst>
+            <a:ext uri="{909E8E84-426E-40DD-AFC4-6F175D3DCCD1}">
+              <a14:hiddenFill xmlns:a14="http://schemas.microsoft.com/office/drawing/2010/main">
+                <a:solidFill>
+                  <a:srgbClr val="FFFFFF"/>
+                </a:solidFill>
+              </a14:hiddenFill>
+            </a:ext>
+            <a:ext uri="{91240B29-F687-4F45-9708-019B960494DF}">
+              <a14:hiddenLine xmlns:a14="http://schemas.microsoft.com/office/drawing/2010/main" w="9525">
+                <a:solidFill>
+                  <a:srgbClr val="000000"/>
+                </a:solidFill>
+                <a:miter lim="800000"/>
+                <a:headEnd/>
+                <a:tailEnd/>
+              </a14:hiddenLine>
+            </a:ext>
+          </a:extLst>
+        </p:spPr>
+      </p:pic>
+      <p:cxnSp>
+        <p:nvCxnSpPr>
+          <p:cNvPr id="75" name="Straight Connector 74">
+            <a:extLst>
+              <a:ext uri="{FF2B5EF4-FFF2-40B4-BE49-F238E27FC236}">
+                <a16:creationId xmlns:a16="http://schemas.microsoft.com/office/drawing/2014/main" id="{6946779A-A117-06FB-FC99-7389A853FC57}"/>
+              </a:ext>
+            </a:extLst>
+          </p:cNvPr>
+          <p:cNvCxnSpPr>
+            <a:cxnSpLocks/>
+            <a:stCxn id="53" idx="2"/>
+            <a:endCxn id="29" idx="0"/>
+          </p:cNvCxnSpPr>
+          <p:nvPr/>
+        </p:nvCxnSpPr>
+        <p:spPr>
+          <a:xfrm>
+            <a:off x="5710637" y="4337061"/>
+            <a:ext cx="1489" cy="246639"/>
           </a:xfrm>
           <a:prstGeom prst="line">
             <a:avLst/>
@@ -20012,505 +21912,24 @@
       </p:cxnSp>
       <p:cxnSp>
         <p:nvCxnSpPr>
-          <p:cNvPr id="97" name="Straight Connector 96">
-            <a:extLst>
-              <a:ext uri="{FF2B5EF4-FFF2-40B4-BE49-F238E27FC236}">
-                <a16:creationId xmlns:a16="http://schemas.microsoft.com/office/drawing/2014/main" id="{941809C9-52A6-8AA3-7314-8379FCC08892}"/>
+          <p:cNvPr id="80" name="Straight Connector 79">
+            <a:extLst>
+              <a:ext uri="{FF2B5EF4-FFF2-40B4-BE49-F238E27FC236}">
+                <a16:creationId xmlns:a16="http://schemas.microsoft.com/office/drawing/2014/main" id="{8FABFBF2-6D42-5C09-9D0F-4EF9E3BB3361}"/>
               </a:ext>
             </a:extLst>
           </p:cNvPr>
           <p:cNvCxnSpPr>
             <a:cxnSpLocks/>
-            <a:endCxn id="27" idx="0"/>
+            <a:stCxn id="54" idx="2"/>
+            <a:endCxn id="41" idx="0"/>
           </p:cNvCxnSpPr>
           <p:nvPr/>
         </p:nvCxnSpPr>
         <p:spPr>
           <a:xfrm>
-            <a:off x="4496079" y="3612253"/>
-            <a:ext cx="0" cy="604628"/>
-          </a:xfrm>
-          <a:prstGeom prst="line">
-            <a:avLst/>
-          </a:prstGeom>
-        </p:spPr>
-        <p:style>
-          <a:lnRef idx="3">
-            <a:schemeClr val="dk1"/>
-          </a:lnRef>
-          <a:fillRef idx="0">
-            <a:schemeClr val="dk1"/>
-          </a:fillRef>
-          <a:effectRef idx="2">
-            <a:schemeClr val="dk1"/>
-          </a:effectRef>
-          <a:fontRef idx="minor">
-            <a:schemeClr val="tx1"/>
-          </a:fontRef>
-        </p:style>
-      </p:cxnSp>
-      <p:pic>
-        <p:nvPicPr>
-          <p:cNvPr id="100" name="Graphic 12">
-            <a:extLst>
-              <a:ext uri="{FF2B5EF4-FFF2-40B4-BE49-F238E27FC236}">
-                <a16:creationId xmlns:a16="http://schemas.microsoft.com/office/drawing/2014/main" id="{622ACBB4-DF1D-1FE3-ED3B-5C99491CA287}"/>
-              </a:ext>
-            </a:extLst>
-          </p:cNvPr>
-          <p:cNvPicPr>
-            <a:picLocks noChangeAspect="1" noChangeArrowheads="1"/>
-          </p:cNvPicPr>
-          <p:nvPr/>
-        </p:nvPicPr>
-        <p:blipFill>
-          <a:blip r:embed="rId18">
-            <a:extLst>
-              <a:ext uri="{28A0092B-C50C-407E-A947-70E740481C1C}">
-                <a14:useLocalDpi xmlns:a14="http://schemas.microsoft.com/office/drawing/2010/main" val="0"/>
-              </a:ext>
-            </a:extLst>
-          </a:blip>
-          <a:srcRect/>
-          <a:stretch>
-            <a:fillRect/>
-          </a:stretch>
-        </p:blipFill>
-        <p:spPr bwMode="auto">
-          <a:xfrm>
-            <a:off x="2674501" y="4558953"/>
-            <a:ext cx="469900" cy="469900"/>
-          </a:xfrm>
-          <a:prstGeom prst="rect">
-            <a:avLst/>
-          </a:prstGeom>
-          <a:noFill/>
-          <a:ln>
-            <a:noFill/>
-          </a:ln>
-          <a:extLst>
-            <a:ext uri="{909E8E84-426E-40DD-AFC4-6F175D3DCCD1}">
-              <a14:hiddenFill xmlns:a14="http://schemas.microsoft.com/office/drawing/2010/main">
-                <a:solidFill>
-                  <a:srgbClr val="FFFFFF"/>
-                </a:solidFill>
-              </a14:hiddenFill>
-            </a:ext>
-            <a:ext uri="{91240B29-F687-4F45-9708-019B960494DF}">
-              <a14:hiddenLine xmlns:a14="http://schemas.microsoft.com/office/drawing/2010/main" w="9525">
-                <a:solidFill>
-                  <a:srgbClr val="000000"/>
-                </a:solidFill>
-                <a:miter lim="800000"/>
-                <a:headEnd/>
-                <a:tailEnd/>
-              </a14:hiddenLine>
-            </a:ext>
-          </a:extLst>
-        </p:spPr>
-      </p:pic>
-      <p:pic>
-        <p:nvPicPr>
-          <p:cNvPr id="101" name="Graphic 12">
-            <a:extLst>
-              <a:ext uri="{FF2B5EF4-FFF2-40B4-BE49-F238E27FC236}">
-                <a16:creationId xmlns:a16="http://schemas.microsoft.com/office/drawing/2014/main" id="{5AEE2A90-00B8-A820-7FDE-A20E772FD840}"/>
-              </a:ext>
-            </a:extLst>
-          </p:cNvPr>
-          <p:cNvPicPr>
-            <a:picLocks noChangeAspect="1" noChangeArrowheads="1"/>
-          </p:cNvPicPr>
-          <p:nvPr/>
-        </p:nvPicPr>
-        <p:blipFill>
-          <a:blip r:embed="rId18">
-            <a:extLst>
-              <a:ext uri="{28A0092B-C50C-407E-A947-70E740481C1C}">
-                <a14:useLocalDpi xmlns:a14="http://schemas.microsoft.com/office/drawing/2010/main" val="0"/>
-              </a:ext>
-            </a:extLst>
-          </a:blip>
-          <a:srcRect/>
-          <a:stretch>
-            <a:fillRect/>
-          </a:stretch>
-        </p:blipFill>
-        <p:spPr bwMode="auto">
-          <a:xfrm>
-            <a:off x="11197937" y="4569843"/>
-            <a:ext cx="469900" cy="469900"/>
-          </a:xfrm>
-          <a:prstGeom prst="rect">
-            <a:avLst/>
-          </a:prstGeom>
-          <a:noFill/>
-          <a:ln>
-            <a:noFill/>
-          </a:ln>
-          <a:extLst>
-            <a:ext uri="{909E8E84-426E-40DD-AFC4-6F175D3DCCD1}">
-              <a14:hiddenFill xmlns:a14="http://schemas.microsoft.com/office/drawing/2010/main">
-                <a:solidFill>
-                  <a:srgbClr val="FFFFFF"/>
-                </a:solidFill>
-              </a14:hiddenFill>
-            </a:ext>
-            <a:ext uri="{91240B29-F687-4F45-9708-019B960494DF}">
-              <a14:hiddenLine xmlns:a14="http://schemas.microsoft.com/office/drawing/2010/main" w="9525">
-                <a:solidFill>
-                  <a:srgbClr val="000000"/>
-                </a:solidFill>
-                <a:miter lim="800000"/>
-                <a:headEnd/>
-                <a:tailEnd/>
-              </a14:hiddenLine>
-            </a:ext>
-          </a:extLst>
-        </p:spPr>
-      </p:pic>
-      <p:sp>
-        <p:nvSpPr>
-          <p:cNvPr id="102" name="TextBox 9">
-            <a:extLst>
-              <a:ext uri="{FF2B5EF4-FFF2-40B4-BE49-F238E27FC236}">
-                <a16:creationId xmlns:a16="http://schemas.microsoft.com/office/drawing/2014/main" id="{13A8DDAC-278B-6CD5-8E3B-14A8339604D8}"/>
-              </a:ext>
-            </a:extLst>
-          </p:cNvPr>
-          <p:cNvSpPr txBox="1">
-            <a:spLocks noChangeArrowheads="1"/>
-          </p:cNvSpPr>
-          <p:nvPr/>
-        </p:nvSpPr>
-        <p:spPr bwMode="auto">
-          <a:xfrm>
-            <a:off x="2534498" y="4912404"/>
-            <a:ext cx="749112" cy="276999"/>
-          </a:xfrm>
-          <a:prstGeom prst="rect">
-            <a:avLst/>
-          </a:prstGeom>
-          <a:noFill/>
-          <a:ln>
-            <a:noFill/>
-          </a:ln>
-          <a:extLst>
-            <a:ext uri="{909E8E84-426E-40DD-AFC4-6F175D3DCCD1}">
-              <a14:hiddenFill xmlns:a14="http://schemas.microsoft.com/office/drawing/2010/main">
-                <a:solidFill>
-                  <a:srgbClr val="FFFFFF"/>
-                </a:solidFill>
-              </a14:hiddenFill>
-            </a:ext>
-            <a:ext uri="{91240B29-F687-4F45-9708-019B960494DF}">
-              <a14:hiddenLine xmlns:a14="http://schemas.microsoft.com/office/drawing/2010/main" w="9525">
-                <a:solidFill>
-                  <a:srgbClr val="000000"/>
-                </a:solidFill>
-                <a:miter lim="800000"/>
-                <a:headEnd/>
-                <a:tailEnd/>
-              </a14:hiddenLine>
-            </a:ext>
-          </a:extLst>
-        </p:spPr>
-        <p:txBody>
-          <a:bodyPr wrap="square">
-            <a:spAutoFit/>
-          </a:bodyPr>
-          <a:lstStyle>
-            <a:lvl1pPr>
-              <a:defRPr>
-                <a:solidFill>
-                  <a:schemeClr val="tx1"/>
-                </a:solidFill>
-                <a:latin typeface="Calibri" panose="020F0502020204030204" pitchFamily="34" charset="0"/>
-              </a:defRPr>
-            </a:lvl1pPr>
-            <a:lvl2pPr marL="742950" indent="-285750">
-              <a:defRPr>
-                <a:solidFill>
-                  <a:schemeClr val="tx1"/>
-                </a:solidFill>
-                <a:latin typeface="Calibri" panose="020F0502020204030204" pitchFamily="34" charset="0"/>
-              </a:defRPr>
-            </a:lvl2pPr>
-            <a:lvl3pPr marL="1143000" indent="-228600">
-              <a:defRPr>
-                <a:solidFill>
-                  <a:schemeClr val="tx1"/>
-                </a:solidFill>
-                <a:latin typeface="Calibri" panose="020F0502020204030204" pitchFamily="34" charset="0"/>
-              </a:defRPr>
-            </a:lvl3pPr>
-            <a:lvl4pPr marL="1600200" indent="-228600">
-              <a:defRPr>
-                <a:solidFill>
-                  <a:schemeClr val="tx1"/>
-                </a:solidFill>
-                <a:latin typeface="Calibri" panose="020F0502020204030204" pitchFamily="34" charset="0"/>
-              </a:defRPr>
-            </a:lvl4pPr>
-            <a:lvl5pPr marL="2057400" indent="-228600">
-              <a:defRPr>
-                <a:solidFill>
-                  <a:schemeClr val="tx1"/>
-                </a:solidFill>
-                <a:latin typeface="Calibri" panose="020F0502020204030204" pitchFamily="34" charset="0"/>
-              </a:defRPr>
-            </a:lvl5pPr>
-            <a:lvl6pPr marL="2514600" indent="-228600" eaLnBrk="0" fontAlgn="base" hangingPunct="0">
-              <a:spcBef>
-                <a:spcPct val="0"/>
-              </a:spcBef>
-              <a:spcAft>
-                <a:spcPct val="0"/>
-              </a:spcAft>
-              <a:defRPr>
-                <a:solidFill>
-                  <a:schemeClr val="tx1"/>
-                </a:solidFill>
-                <a:latin typeface="Calibri" panose="020F0502020204030204" pitchFamily="34" charset="0"/>
-              </a:defRPr>
-            </a:lvl6pPr>
-            <a:lvl7pPr marL="2971800" indent="-228600" eaLnBrk="0" fontAlgn="base" hangingPunct="0">
-              <a:spcBef>
-                <a:spcPct val="0"/>
-              </a:spcBef>
-              <a:spcAft>
-                <a:spcPct val="0"/>
-              </a:spcAft>
-              <a:defRPr>
-                <a:solidFill>
-                  <a:schemeClr val="tx1"/>
-                </a:solidFill>
-                <a:latin typeface="Calibri" panose="020F0502020204030204" pitchFamily="34" charset="0"/>
-              </a:defRPr>
-            </a:lvl7pPr>
-            <a:lvl8pPr marL="3429000" indent="-228600" eaLnBrk="0" fontAlgn="base" hangingPunct="0">
-              <a:spcBef>
-                <a:spcPct val="0"/>
-              </a:spcBef>
-              <a:spcAft>
-                <a:spcPct val="0"/>
-              </a:spcAft>
-              <a:defRPr>
-                <a:solidFill>
-                  <a:schemeClr val="tx1"/>
-                </a:solidFill>
-                <a:latin typeface="Calibri" panose="020F0502020204030204" pitchFamily="34" charset="0"/>
-              </a:defRPr>
-            </a:lvl8pPr>
-            <a:lvl9pPr marL="3886200" indent="-228600" eaLnBrk="0" fontAlgn="base" hangingPunct="0">
-              <a:spcBef>
-                <a:spcPct val="0"/>
-              </a:spcBef>
-              <a:spcAft>
-                <a:spcPct val="0"/>
-              </a:spcAft>
-              <a:defRPr>
-                <a:solidFill>
-                  <a:schemeClr val="tx1"/>
-                </a:solidFill>
-                <a:latin typeface="Calibri" panose="020F0502020204030204" pitchFamily="34" charset="0"/>
-              </a:defRPr>
-            </a:lvl9pPr>
-          </a:lstStyle>
-          <a:p>
-            <a:pPr algn="ctr" eaLnBrk="1" hangingPunct="1"/>
-            <a:r>
-              <a:rPr lang="en-US" altLang="en-US" sz="1200" dirty="0">
-                <a:latin typeface="Arial" panose="020B0604020202020204" pitchFamily="34" charset="0"/>
-                <a:ea typeface="Amazon Ember" panose="020B0603020204020204" pitchFamily="34" charset="0"/>
-                <a:cs typeface="Arial" panose="020B0604020202020204" pitchFamily="34" charset="0"/>
-              </a:rPr>
-              <a:t>Internet</a:t>
-            </a:r>
-          </a:p>
-        </p:txBody>
-      </p:sp>
-      <p:sp>
-        <p:nvSpPr>
-          <p:cNvPr id="103" name="TextBox 9">
-            <a:extLst>
-              <a:ext uri="{FF2B5EF4-FFF2-40B4-BE49-F238E27FC236}">
-                <a16:creationId xmlns:a16="http://schemas.microsoft.com/office/drawing/2014/main" id="{DA12F318-D8DC-8C61-00FE-9E9D0934F93C}"/>
-              </a:ext>
-            </a:extLst>
-          </p:cNvPr>
-          <p:cNvSpPr txBox="1">
-            <a:spLocks noChangeArrowheads="1"/>
-          </p:cNvSpPr>
-          <p:nvPr/>
-        </p:nvSpPr>
-        <p:spPr bwMode="auto">
-          <a:xfrm>
-            <a:off x="11062859" y="4958330"/>
-            <a:ext cx="749112" cy="276999"/>
-          </a:xfrm>
-          <a:prstGeom prst="rect">
-            <a:avLst/>
-          </a:prstGeom>
-          <a:noFill/>
-          <a:ln>
-            <a:noFill/>
-          </a:ln>
-          <a:extLst>
-            <a:ext uri="{909E8E84-426E-40DD-AFC4-6F175D3DCCD1}">
-              <a14:hiddenFill xmlns:a14="http://schemas.microsoft.com/office/drawing/2010/main">
-                <a:solidFill>
-                  <a:srgbClr val="FFFFFF"/>
-                </a:solidFill>
-              </a14:hiddenFill>
-            </a:ext>
-            <a:ext uri="{91240B29-F687-4F45-9708-019B960494DF}">
-              <a14:hiddenLine xmlns:a14="http://schemas.microsoft.com/office/drawing/2010/main" w="9525">
-                <a:solidFill>
-                  <a:srgbClr val="000000"/>
-                </a:solidFill>
-                <a:miter lim="800000"/>
-                <a:headEnd/>
-                <a:tailEnd/>
-              </a14:hiddenLine>
-            </a:ext>
-          </a:extLst>
-        </p:spPr>
-        <p:txBody>
-          <a:bodyPr wrap="square">
-            <a:spAutoFit/>
-          </a:bodyPr>
-          <a:lstStyle>
-            <a:lvl1pPr>
-              <a:defRPr>
-                <a:solidFill>
-                  <a:schemeClr val="tx1"/>
-                </a:solidFill>
-                <a:latin typeface="Calibri" panose="020F0502020204030204" pitchFamily="34" charset="0"/>
-              </a:defRPr>
-            </a:lvl1pPr>
-            <a:lvl2pPr marL="742950" indent="-285750">
-              <a:defRPr>
-                <a:solidFill>
-                  <a:schemeClr val="tx1"/>
-                </a:solidFill>
-                <a:latin typeface="Calibri" panose="020F0502020204030204" pitchFamily="34" charset="0"/>
-              </a:defRPr>
-            </a:lvl2pPr>
-            <a:lvl3pPr marL="1143000" indent="-228600">
-              <a:defRPr>
-                <a:solidFill>
-                  <a:schemeClr val="tx1"/>
-                </a:solidFill>
-                <a:latin typeface="Calibri" panose="020F0502020204030204" pitchFamily="34" charset="0"/>
-              </a:defRPr>
-            </a:lvl3pPr>
-            <a:lvl4pPr marL="1600200" indent="-228600">
-              <a:defRPr>
-                <a:solidFill>
-                  <a:schemeClr val="tx1"/>
-                </a:solidFill>
-                <a:latin typeface="Calibri" panose="020F0502020204030204" pitchFamily="34" charset="0"/>
-              </a:defRPr>
-            </a:lvl4pPr>
-            <a:lvl5pPr marL="2057400" indent="-228600">
-              <a:defRPr>
-                <a:solidFill>
-                  <a:schemeClr val="tx1"/>
-                </a:solidFill>
-                <a:latin typeface="Calibri" panose="020F0502020204030204" pitchFamily="34" charset="0"/>
-              </a:defRPr>
-            </a:lvl5pPr>
-            <a:lvl6pPr marL="2514600" indent="-228600" eaLnBrk="0" fontAlgn="base" hangingPunct="0">
-              <a:spcBef>
-                <a:spcPct val="0"/>
-              </a:spcBef>
-              <a:spcAft>
-                <a:spcPct val="0"/>
-              </a:spcAft>
-              <a:defRPr>
-                <a:solidFill>
-                  <a:schemeClr val="tx1"/>
-                </a:solidFill>
-                <a:latin typeface="Calibri" panose="020F0502020204030204" pitchFamily="34" charset="0"/>
-              </a:defRPr>
-            </a:lvl6pPr>
-            <a:lvl7pPr marL="2971800" indent="-228600" eaLnBrk="0" fontAlgn="base" hangingPunct="0">
-              <a:spcBef>
-                <a:spcPct val="0"/>
-              </a:spcBef>
-              <a:spcAft>
-                <a:spcPct val="0"/>
-              </a:spcAft>
-              <a:defRPr>
-                <a:solidFill>
-                  <a:schemeClr val="tx1"/>
-                </a:solidFill>
-                <a:latin typeface="Calibri" panose="020F0502020204030204" pitchFamily="34" charset="0"/>
-              </a:defRPr>
-            </a:lvl7pPr>
-            <a:lvl8pPr marL="3429000" indent="-228600" eaLnBrk="0" fontAlgn="base" hangingPunct="0">
-              <a:spcBef>
-                <a:spcPct val="0"/>
-              </a:spcBef>
-              <a:spcAft>
-                <a:spcPct val="0"/>
-              </a:spcAft>
-              <a:defRPr>
-                <a:solidFill>
-                  <a:schemeClr val="tx1"/>
-                </a:solidFill>
-                <a:latin typeface="Calibri" panose="020F0502020204030204" pitchFamily="34" charset="0"/>
-              </a:defRPr>
-            </a:lvl8pPr>
-            <a:lvl9pPr marL="3886200" indent="-228600" eaLnBrk="0" fontAlgn="base" hangingPunct="0">
-              <a:spcBef>
-                <a:spcPct val="0"/>
-              </a:spcBef>
-              <a:spcAft>
-                <a:spcPct val="0"/>
-              </a:spcAft>
-              <a:defRPr>
-                <a:solidFill>
-                  <a:schemeClr val="tx1"/>
-                </a:solidFill>
-                <a:latin typeface="Calibri" panose="020F0502020204030204" pitchFamily="34" charset="0"/>
-              </a:defRPr>
-            </a:lvl9pPr>
-          </a:lstStyle>
-          <a:p>
-            <a:pPr algn="ctr" eaLnBrk="1" hangingPunct="1"/>
-            <a:r>
-              <a:rPr lang="en-US" altLang="en-US" sz="1200" dirty="0">
-                <a:latin typeface="Arial" panose="020B0604020202020204" pitchFamily="34" charset="0"/>
-                <a:ea typeface="Amazon Ember" panose="020B0603020204020204" pitchFamily="34" charset="0"/>
-                <a:cs typeface="Arial" panose="020B0604020202020204" pitchFamily="34" charset="0"/>
-              </a:rPr>
-              <a:t>Internet</a:t>
-            </a:r>
-          </a:p>
-        </p:txBody>
-      </p:sp>
-      <p:cxnSp>
-        <p:nvCxnSpPr>
-          <p:cNvPr id="104" name="Straight Connector 103">
-            <a:extLst>
-              <a:ext uri="{FF2B5EF4-FFF2-40B4-BE49-F238E27FC236}">
-                <a16:creationId xmlns:a16="http://schemas.microsoft.com/office/drawing/2014/main" id="{1626ECF9-8101-9DA3-F934-D7A13C8F1AB7}"/>
-              </a:ext>
-            </a:extLst>
-          </p:cNvPr>
-          <p:cNvCxnSpPr>
-            <a:cxnSpLocks/>
-            <a:stCxn id="27" idx="1"/>
-            <a:endCxn id="100" idx="3"/>
-          </p:cNvCxnSpPr>
-          <p:nvPr/>
-        </p:nvCxnSpPr>
-        <p:spPr>
-          <a:xfrm flipH="1" flipV="1">
-            <a:off x="3144401" y="4793903"/>
-            <a:ext cx="614613" cy="799"/>
+            <a:off x="7751906" y="4332085"/>
+            <a:ext cx="0" cy="267468"/>
           </a:xfrm>
           <a:prstGeom prst="line">
             <a:avLst/>
@@ -20533,24 +21952,62 @@
       </p:cxnSp>
       <p:cxnSp>
         <p:nvCxnSpPr>
-          <p:cNvPr id="107" name="Straight Connector 106">
-            <a:extLst>
-              <a:ext uri="{FF2B5EF4-FFF2-40B4-BE49-F238E27FC236}">
-                <a16:creationId xmlns:a16="http://schemas.microsoft.com/office/drawing/2014/main" id="{BF0D33EC-29DE-9400-C54E-E87F47B54259}"/>
+          <p:cNvPr id="85" name="Straight Connector 84">
+            <a:extLst>
+              <a:ext uri="{FF2B5EF4-FFF2-40B4-BE49-F238E27FC236}">
+                <a16:creationId xmlns:a16="http://schemas.microsoft.com/office/drawing/2014/main" id="{4EA70B2B-FA7A-1AE8-ECCB-25C1D8045D5C}"/>
               </a:ext>
             </a:extLst>
           </p:cNvPr>
           <p:cNvCxnSpPr>
             <a:cxnSpLocks/>
-            <a:stCxn id="101" idx="1"/>
-            <a:endCxn id="33" idx="3"/>
+            <a:endCxn id="53" idx="0"/>
           </p:cNvCxnSpPr>
           <p:nvPr/>
         </p:nvCxnSpPr>
         <p:spPr>
-          <a:xfrm flipH="1" flipV="1">
-            <a:off x="10686841" y="4802602"/>
-            <a:ext cx="511096" cy="2191"/>
+          <a:xfrm>
+            <a:off x="5710637" y="3484453"/>
+            <a:ext cx="0" cy="367454"/>
+          </a:xfrm>
+          <a:prstGeom prst="line">
+            <a:avLst/>
+          </a:prstGeom>
+        </p:spPr>
+        <p:style>
+          <a:lnRef idx="3">
+            <a:schemeClr val="dk1"/>
+          </a:lnRef>
+          <a:fillRef idx="0">
+            <a:schemeClr val="dk1"/>
+          </a:fillRef>
+          <a:effectRef idx="2">
+            <a:schemeClr val="dk1"/>
+          </a:effectRef>
+          <a:fontRef idx="minor">
+            <a:schemeClr val="tx1"/>
+          </a:fontRef>
+        </p:style>
+      </p:cxnSp>
+      <p:cxnSp>
+        <p:nvCxnSpPr>
+          <p:cNvPr id="89" name="Straight Connector 88">
+            <a:extLst>
+              <a:ext uri="{FF2B5EF4-FFF2-40B4-BE49-F238E27FC236}">
+                <a16:creationId xmlns:a16="http://schemas.microsoft.com/office/drawing/2014/main" id="{56834275-1714-F7A7-5B2B-62657A4C265B}"/>
+              </a:ext>
+            </a:extLst>
+          </p:cNvPr>
+          <p:cNvCxnSpPr>
+            <a:cxnSpLocks/>
+            <a:endCxn id="54" idx="0"/>
+          </p:cNvCxnSpPr>
+          <p:nvPr/>
+        </p:nvCxnSpPr>
+        <p:spPr>
+          <a:xfrm>
+            <a:off x="7751906" y="3494729"/>
+            <a:ext cx="0" cy="352202"/>
           </a:xfrm>
           <a:prstGeom prst="line">
             <a:avLst/>

</xml_diff>